<commit_message>
merge Andrea Fig 3C into manuscript
</commit_message>
<xml_diff>
--- a/figures/titers.pptx
+++ b/figures/titers.pptx
@@ -2,12 +2,12 @@
 <file path=ppt/presentation.xml><?xml version="1.0" encoding="utf-8"?>
 <p:presentation xmlns:a="http://schemas.openxmlformats.org/drawingml/2006/main" xmlns:r="http://schemas.openxmlformats.org/officeDocument/2006/relationships" xmlns:p="http://schemas.openxmlformats.org/presentationml/2006/main" saveSubsetFonts="1" autoCompressPictures="0">
   <p:sldMasterIdLst>
-    <p:sldMasterId id="2147483672" r:id="rId1"/>
+    <p:sldMasterId id="2147483696" r:id="rId1"/>
   </p:sldMasterIdLst>
   <p:sldIdLst>
     <p:sldId id="256" r:id="rId2"/>
   </p:sldIdLst>
-  <p:sldSz cx="10972800" cy="4664075"/>
+  <p:sldSz cx="10972800" cy="7497763"/>
   <p:notesSz cx="6858000" cy="9144000"/>
   <p:defaultTextStyle>
     <a:defPPr>
@@ -104,15 +104,894 @@
       </a:defRPr>
     </a:lvl9pPr>
   </p:defaultTextStyle>
+  <p:extLst>
+    <p:ext uri="{EFAFB233-063F-42B5-8137-9DF3F51BA10A}">
+      <p15:sldGuideLst xmlns:p15="http://schemas.microsoft.com/office/powerpoint/2012/main"/>
+    </p:ext>
+  </p:extLst>
 </p:presentation>
 </file>
 
 <file path=ppt/revisionInfo.xml><?xml version="1.0" encoding="utf-8"?>
 <p1510:revInfo xmlns:a="http://schemas.openxmlformats.org/drawingml/2006/main" xmlns:r="http://schemas.openxmlformats.org/officeDocument/2006/relationships" xmlns:p1510="http://schemas.microsoft.com/office/powerpoint/2015/10/main">
   <p1510:revLst>
+    <p1510:client id="{AF750AC1-FCBC-C64B-9154-23FC45454528}" v="8" dt="2020-04-15T23:06:48.858"/>
     <p1510:client id="{E3934544-98F8-144B-B166-2956C8FBEA89}" v="11" dt="2020-04-15T04:24:13.369"/>
   </p1510:revLst>
 </p1510:revInfo>
+</file>
+
+<file path=ppt/changesInfos/changesInfo1.xml><?xml version="1.0" encoding="utf-8"?>
+<pc:chgInfo xmlns:a="http://schemas.openxmlformats.org/drawingml/2006/main" xmlns:r="http://schemas.openxmlformats.org/officeDocument/2006/relationships" xmlns:ac="http://schemas.microsoft.com/office/drawing/2013/main/command" xmlns:pc="http://schemas.microsoft.com/office/powerpoint/2013/main/command">
+  <pc:docChgLst>
+    <pc:chgData name="Bloom PhD, Jesse D" userId="e17e4af4-92ba-4f4f-89d8-f6d4f5501821" providerId="ADAL" clId="{AF750AC1-FCBC-C64B-9154-23FC45454528}"/>
+    <pc:docChg chg="undo custSel modSld modMainMaster">
+      <pc:chgData name="Bloom PhD, Jesse D" userId="e17e4af4-92ba-4f4f-89d8-f6d4f5501821" providerId="ADAL" clId="{AF750AC1-FCBC-C64B-9154-23FC45454528}" dt="2020-04-15T23:06:55.041" v="61" actId="20577"/>
+      <pc:docMkLst>
+        <pc:docMk/>
+      </pc:docMkLst>
+      <pc:sldChg chg="addSp delSp modSp">
+        <pc:chgData name="Bloom PhD, Jesse D" userId="e17e4af4-92ba-4f4f-89d8-f6d4f5501821" providerId="ADAL" clId="{AF750AC1-FCBC-C64B-9154-23FC45454528}" dt="2020-04-15T23:06:55.041" v="61" actId="20577"/>
+        <pc:sldMkLst>
+          <pc:docMk/>
+          <pc:sldMk cId="974113834" sldId="256"/>
+        </pc:sldMkLst>
+        <pc:spChg chg="mod">
+          <ac:chgData name="Bloom PhD, Jesse D" userId="e17e4af4-92ba-4f4f-89d8-f6d4f5501821" providerId="ADAL" clId="{AF750AC1-FCBC-C64B-9154-23FC45454528}" dt="2020-04-15T23:04:27.836" v="2"/>
+          <ac:spMkLst>
+            <pc:docMk/>
+            <pc:sldMk cId="974113834" sldId="256"/>
+            <ac:spMk id="10" creationId="{107774EA-CABD-5A42-84BA-26978448E4E3}"/>
+          </ac:spMkLst>
+        </pc:spChg>
+        <pc:spChg chg="mod">
+          <ac:chgData name="Bloom PhD, Jesse D" userId="e17e4af4-92ba-4f4f-89d8-f6d4f5501821" providerId="ADAL" clId="{AF750AC1-FCBC-C64B-9154-23FC45454528}" dt="2020-04-15T23:04:27.836" v="2"/>
+          <ac:spMkLst>
+            <pc:docMk/>
+            <pc:sldMk cId="974113834" sldId="256"/>
+            <ac:spMk id="11" creationId="{93AFB325-4AA0-DF4E-888B-1BE094EEEB2F}"/>
+          </ac:spMkLst>
+        </pc:spChg>
+        <pc:spChg chg="mod">
+          <ac:chgData name="Bloom PhD, Jesse D" userId="e17e4af4-92ba-4f4f-89d8-f6d4f5501821" providerId="ADAL" clId="{AF750AC1-FCBC-C64B-9154-23FC45454528}" dt="2020-04-15T23:04:46.353" v="3"/>
+          <ac:spMkLst>
+            <pc:docMk/>
+            <pc:sldMk cId="974113834" sldId="256"/>
+            <ac:spMk id="13" creationId="{86AFC9DC-E79A-3049-9B5B-51CAFD9C0A48}"/>
+          </ac:spMkLst>
+        </pc:spChg>
+        <pc:spChg chg="mod">
+          <ac:chgData name="Bloom PhD, Jesse D" userId="e17e4af4-92ba-4f4f-89d8-f6d4f5501821" providerId="ADAL" clId="{AF750AC1-FCBC-C64B-9154-23FC45454528}" dt="2020-04-15T23:04:46.353" v="3"/>
+          <ac:spMkLst>
+            <pc:docMk/>
+            <pc:sldMk cId="974113834" sldId="256"/>
+            <ac:spMk id="14" creationId="{2C838CCB-77EF-224C-ADE2-56BFAE8B045E}"/>
+          </ac:spMkLst>
+        </pc:spChg>
+        <pc:spChg chg="mod">
+          <ac:chgData name="Bloom PhD, Jesse D" userId="e17e4af4-92ba-4f4f-89d8-f6d4f5501821" providerId="ADAL" clId="{AF750AC1-FCBC-C64B-9154-23FC45454528}" dt="2020-04-15T23:05:28.078" v="11" actId="1076"/>
+          <ac:spMkLst>
+            <pc:docMk/>
+            <pc:sldMk cId="974113834" sldId="256"/>
+            <ac:spMk id="15" creationId="{3BF9B83C-FB01-464F-978C-16C8126068B1}"/>
+          </ac:spMkLst>
+        </pc:spChg>
+        <pc:spChg chg="mod">
+          <ac:chgData name="Bloom PhD, Jesse D" userId="e17e4af4-92ba-4f4f-89d8-f6d4f5501821" providerId="ADAL" clId="{AF750AC1-FCBC-C64B-9154-23FC45454528}" dt="2020-04-15T23:05:28.078" v="11" actId="1076"/>
+          <ac:spMkLst>
+            <pc:docMk/>
+            <pc:sldMk cId="974113834" sldId="256"/>
+            <ac:spMk id="16" creationId="{109ACC3C-CC07-3040-8B1F-67426E749EBE}"/>
+          </ac:spMkLst>
+        </pc:spChg>
+        <pc:spChg chg="mod">
+          <ac:chgData name="Bloom PhD, Jesse D" userId="e17e4af4-92ba-4f4f-89d8-f6d4f5501821" providerId="ADAL" clId="{AF750AC1-FCBC-C64B-9154-23FC45454528}" dt="2020-04-15T23:04:46.353" v="3"/>
+          <ac:spMkLst>
+            <pc:docMk/>
+            <pc:sldMk cId="974113834" sldId="256"/>
+            <ac:spMk id="22" creationId="{B2352D45-4E79-E74C-91AD-AB1644E632D3}"/>
+          </ac:spMkLst>
+        </pc:spChg>
+        <pc:spChg chg="mod">
+          <ac:chgData name="Bloom PhD, Jesse D" userId="e17e4af4-92ba-4f4f-89d8-f6d4f5501821" providerId="ADAL" clId="{AF750AC1-FCBC-C64B-9154-23FC45454528}" dt="2020-04-15T23:04:46.353" v="3"/>
+          <ac:spMkLst>
+            <pc:docMk/>
+            <pc:sldMk cId="974113834" sldId="256"/>
+            <ac:spMk id="23" creationId="{D29EA916-24E0-EB4B-AE4D-3C3905206F84}"/>
+          </ac:spMkLst>
+        </pc:spChg>
+        <pc:spChg chg="mod">
+          <ac:chgData name="Bloom PhD, Jesse D" userId="e17e4af4-92ba-4f4f-89d8-f6d4f5501821" providerId="ADAL" clId="{AF750AC1-FCBC-C64B-9154-23FC45454528}" dt="2020-04-15T23:05:58.225" v="15"/>
+          <ac:spMkLst>
+            <pc:docMk/>
+            <pc:sldMk cId="974113834" sldId="256"/>
+            <ac:spMk id="33" creationId="{0AE36058-A69F-4546-8C77-ADD57E28048B}"/>
+          </ac:spMkLst>
+        </pc:spChg>
+        <pc:spChg chg="mod">
+          <ac:chgData name="Bloom PhD, Jesse D" userId="e17e4af4-92ba-4f4f-89d8-f6d4f5501821" providerId="ADAL" clId="{AF750AC1-FCBC-C64B-9154-23FC45454528}" dt="2020-04-15T23:05:58.225" v="15"/>
+          <ac:spMkLst>
+            <pc:docMk/>
+            <pc:sldMk cId="974113834" sldId="256"/>
+            <ac:spMk id="34" creationId="{3EF38BF9-28C2-3845-98F0-AD9502F31D2D}"/>
+          </ac:spMkLst>
+        </pc:spChg>
+        <pc:spChg chg="mod">
+          <ac:chgData name="Bloom PhD, Jesse D" userId="e17e4af4-92ba-4f4f-89d8-f6d4f5501821" providerId="ADAL" clId="{AF750AC1-FCBC-C64B-9154-23FC45454528}" dt="2020-04-15T23:05:58.225" v="15"/>
+          <ac:spMkLst>
+            <pc:docMk/>
+            <pc:sldMk cId="974113834" sldId="256"/>
+            <ac:spMk id="36" creationId="{55B0701C-D9A8-9A45-B97C-4348380CC216}"/>
+          </ac:spMkLst>
+        </pc:spChg>
+        <pc:spChg chg="mod">
+          <ac:chgData name="Bloom PhD, Jesse D" userId="e17e4af4-92ba-4f4f-89d8-f6d4f5501821" providerId="ADAL" clId="{AF750AC1-FCBC-C64B-9154-23FC45454528}" dt="2020-04-15T23:05:58.225" v="15"/>
+          <ac:spMkLst>
+            <pc:docMk/>
+            <pc:sldMk cId="974113834" sldId="256"/>
+            <ac:spMk id="37" creationId="{2BB19E0C-1722-3747-900F-4143B570B309}"/>
+          </ac:spMkLst>
+        </pc:spChg>
+        <pc:spChg chg="mod">
+          <ac:chgData name="Bloom PhD, Jesse D" userId="e17e4af4-92ba-4f4f-89d8-f6d4f5501821" providerId="ADAL" clId="{AF750AC1-FCBC-C64B-9154-23FC45454528}" dt="2020-04-15T23:06:15.068" v="36" actId="20577"/>
+          <ac:spMkLst>
+            <pc:docMk/>
+            <pc:sldMk cId="974113834" sldId="256"/>
+            <ac:spMk id="38" creationId="{7B95F309-480F-114E-8F0E-EE3777AB4811}"/>
+          </ac:spMkLst>
+        </pc:spChg>
+        <pc:spChg chg="mod">
+          <ac:chgData name="Bloom PhD, Jesse D" userId="e17e4af4-92ba-4f4f-89d8-f6d4f5501821" providerId="ADAL" clId="{AF750AC1-FCBC-C64B-9154-23FC45454528}" dt="2020-04-15T23:06:29.124" v="58" actId="20577"/>
+          <ac:spMkLst>
+            <pc:docMk/>
+            <pc:sldMk cId="974113834" sldId="256"/>
+            <ac:spMk id="39" creationId="{D39D4AFA-08F6-7E4B-8483-6E14F2277E49}"/>
+          </ac:spMkLst>
+        </pc:spChg>
+        <pc:spChg chg="mod">
+          <ac:chgData name="Bloom PhD, Jesse D" userId="e17e4af4-92ba-4f4f-89d8-f6d4f5501821" providerId="ADAL" clId="{AF750AC1-FCBC-C64B-9154-23FC45454528}" dt="2020-04-15T23:05:58.225" v="15"/>
+          <ac:spMkLst>
+            <pc:docMk/>
+            <pc:sldMk cId="974113834" sldId="256"/>
+            <ac:spMk id="40" creationId="{C6507B3D-B7AC-5E44-B2AE-65A48DB9D271}"/>
+          </ac:spMkLst>
+        </pc:spChg>
+        <pc:spChg chg="mod">
+          <ac:chgData name="Bloom PhD, Jesse D" userId="e17e4af4-92ba-4f4f-89d8-f6d4f5501821" providerId="ADAL" clId="{AF750AC1-FCBC-C64B-9154-23FC45454528}" dt="2020-04-15T23:05:58.225" v="15"/>
+          <ac:spMkLst>
+            <pc:docMk/>
+            <pc:sldMk cId="974113834" sldId="256"/>
+            <ac:spMk id="41" creationId="{DA58D8EC-59B0-5B43-8FB1-84D935E3078E}"/>
+          </ac:spMkLst>
+        </pc:spChg>
+        <pc:spChg chg="add mod">
+          <ac:chgData name="Bloom PhD, Jesse D" userId="e17e4af4-92ba-4f4f-89d8-f6d4f5501821" providerId="ADAL" clId="{AF750AC1-FCBC-C64B-9154-23FC45454528}" dt="2020-04-15T23:06:55.041" v="61" actId="20577"/>
+          <ac:spMkLst>
+            <pc:docMk/>
+            <pc:sldMk cId="974113834" sldId="256"/>
+            <ac:spMk id="48" creationId="{95849FDE-6CDA-CB43-89E9-77E91592C44B}"/>
+          </ac:spMkLst>
+        </pc:spChg>
+        <pc:grpChg chg="add del mod">
+          <ac:chgData name="Bloom PhD, Jesse D" userId="e17e4af4-92ba-4f4f-89d8-f6d4f5501821" providerId="ADAL" clId="{AF750AC1-FCBC-C64B-9154-23FC45454528}" dt="2020-04-15T23:05:46.917" v="13"/>
+          <ac:grpSpMkLst>
+            <pc:docMk/>
+            <pc:sldMk cId="974113834" sldId="256"/>
+            <ac:grpSpMk id="7" creationId="{E38989B5-CFF7-FC4F-A78B-5C6AE2EB1E54}"/>
+          </ac:grpSpMkLst>
+        </pc:grpChg>
+        <pc:grpChg chg="add del mod">
+          <ac:chgData name="Bloom PhD, Jesse D" userId="e17e4af4-92ba-4f4f-89d8-f6d4f5501821" providerId="ADAL" clId="{AF750AC1-FCBC-C64B-9154-23FC45454528}" dt="2020-04-15T23:05:46.917" v="13"/>
+          <ac:grpSpMkLst>
+            <pc:docMk/>
+            <pc:sldMk cId="974113834" sldId="256"/>
+            <ac:grpSpMk id="12" creationId="{359C6DE3-FF35-E34E-BCDB-605EF7B9F701}"/>
+          </ac:grpSpMkLst>
+        </pc:grpChg>
+        <pc:grpChg chg="del">
+          <ac:chgData name="Bloom PhD, Jesse D" userId="e17e4af4-92ba-4f4f-89d8-f6d4f5501821" providerId="ADAL" clId="{AF750AC1-FCBC-C64B-9154-23FC45454528}" dt="2020-04-15T23:04:12.940" v="0"/>
+          <ac:grpSpMkLst>
+            <pc:docMk/>
+            <pc:sldMk cId="974113834" sldId="256"/>
+            <ac:grpSpMk id="17" creationId="{B9C142DC-1D1B-F649-9422-954CBDD24406}"/>
+          </ac:grpSpMkLst>
+        </pc:grpChg>
+        <pc:grpChg chg="add mod">
+          <ac:chgData name="Bloom PhD, Jesse D" userId="e17e4af4-92ba-4f4f-89d8-f6d4f5501821" providerId="ADAL" clId="{AF750AC1-FCBC-C64B-9154-23FC45454528}" dt="2020-04-15T23:06:03.788" v="17" actId="1076"/>
+          <ac:grpSpMkLst>
+            <pc:docMk/>
+            <pc:sldMk cId="974113834" sldId="256"/>
+            <ac:grpSpMk id="30" creationId="{51C49904-0780-0346-ABAB-EAB84ACC90B6}"/>
+          </ac:grpSpMkLst>
+        </pc:grpChg>
+        <pc:grpChg chg="add mod">
+          <ac:chgData name="Bloom PhD, Jesse D" userId="e17e4af4-92ba-4f4f-89d8-f6d4f5501821" providerId="ADAL" clId="{AF750AC1-FCBC-C64B-9154-23FC45454528}" dt="2020-04-15T23:06:07.610" v="18" actId="1076"/>
+          <ac:grpSpMkLst>
+            <pc:docMk/>
+            <pc:sldMk cId="974113834" sldId="256"/>
+            <ac:grpSpMk id="35" creationId="{A76B6796-FF9F-A848-91C2-4DE9D8E58585}"/>
+          </ac:grpSpMkLst>
+        </pc:grpChg>
+        <pc:picChg chg="mod">
+          <ac:chgData name="Bloom PhD, Jesse D" userId="e17e4af4-92ba-4f4f-89d8-f6d4f5501821" providerId="ADAL" clId="{AF750AC1-FCBC-C64B-9154-23FC45454528}" dt="2020-04-15T23:04:27.836" v="2"/>
+          <ac:picMkLst>
+            <pc:docMk/>
+            <pc:sldMk cId="974113834" sldId="256"/>
+            <ac:picMk id="8" creationId="{767EB712-E6A8-E94A-BE9F-14C63687648B}"/>
+          </ac:picMkLst>
+        </pc:picChg>
+        <pc:picChg chg="mod">
+          <ac:chgData name="Bloom PhD, Jesse D" userId="e17e4af4-92ba-4f4f-89d8-f6d4f5501821" providerId="ADAL" clId="{AF750AC1-FCBC-C64B-9154-23FC45454528}" dt="2020-04-15T23:04:27.836" v="2"/>
+          <ac:picMkLst>
+            <pc:docMk/>
+            <pc:sldMk cId="974113834" sldId="256"/>
+            <ac:picMk id="9" creationId="{F4E985D8-8180-D84E-B390-516DFA30D7FE}"/>
+          </ac:picMkLst>
+        </pc:picChg>
+        <pc:picChg chg="mod">
+          <ac:chgData name="Bloom PhD, Jesse D" userId="e17e4af4-92ba-4f4f-89d8-f6d4f5501821" providerId="ADAL" clId="{AF750AC1-FCBC-C64B-9154-23FC45454528}" dt="2020-04-15T23:04:46.353" v="3"/>
+          <ac:picMkLst>
+            <pc:docMk/>
+            <pc:sldMk cId="974113834" sldId="256"/>
+            <ac:picMk id="26" creationId="{CE4F3D32-7948-7743-9B4E-B6B80D3EF458}"/>
+          </ac:picMkLst>
+        </pc:picChg>
+        <pc:picChg chg="mod">
+          <ac:chgData name="Bloom PhD, Jesse D" userId="e17e4af4-92ba-4f4f-89d8-f6d4f5501821" providerId="ADAL" clId="{AF750AC1-FCBC-C64B-9154-23FC45454528}" dt="2020-04-15T23:04:46.353" v="3"/>
+          <ac:picMkLst>
+            <pc:docMk/>
+            <pc:sldMk cId="974113834" sldId="256"/>
+            <ac:picMk id="27" creationId="{0256930E-1FEF-EB4D-8355-D707D215BF45}"/>
+          </ac:picMkLst>
+        </pc:picChg>
+        <pc:picChg chg="mod">
+          <ac:chgData name="Bloom PhD, Jesse D" userId="e17e4af4-92ba-4f4f-89d8-f6d4f5501821" providerId="ADAL" clId="{AF750AC1-FCBC-C64B-9154-23FC45454528}" dt="2020-04-15T23:04:46.353" v="3"/>
+          <ac:picMkLst>
+            <pc:docMk/>
+            <pc:sldMk cId="974113834" sldId="256"/>
+            <ac:picMk id="28" creationId="{1EA25DDD-435A-E943-BE27-73DDE14B32AB}"/>
+          </ac:picMkLst>
+        </pc:picChg>
+        <pc:picChg chg="mod">
+          <ac:chgData name="Bloom PhD, Jesse D" userId="e17e4af4-92ba-4f4f-89d8-f6d4f5501821" providerId="ADAL" clId="{AF750AC1-FCBC-C64B-9154-23FC45454528}" dt="2020-04-15T23:04:46.353" v="3"/>
+          <ac:picMkLst>
+            <pc:docMk/>
+            <pc:sldMk cId="974113834" sldId="256"/>
+            <ac:picMk id="29" creationId="{518C939B-5611-EB45-96C1-4ACA72CF3C00}"/>
+          </ac:picMkLst>
+        </pc:picChg>
+        <pc:picChg chg="mod">
+          <ac:chgData name="Bloom PhD, Jesse D" userId="e17e4af4-92ba-4f4f-89d8-f6d4f5501821" providerId="ADAL" clId="{AF750AC1-FCBC-C64B-9154-23FC45454528}" dt="2020-04-15T23:05:58.225" v="15"/>
+          <ac:picMkLst>
+            <pc:docMk/>
+            <pc:sldMk cId="974113834" sldId="256"/>
+            <ac:picMk id="31" creationId="{FA342735-974C-6349-9D98-25C53E28A1B4}"/>
+          </ac:picMkLst>
+        </pc:picChg>
+        <pc:picChg chg="mod">
+          <ac:chgData name="Bloom PhD, Jesse D" userId="e17e4af4-92ba-4f4f-89d8-f6d4f5501821" providerId="ADAL" clId="{AF750AC1-FCBC-C64B-9154-23FC45454528}" dt="2020-04-15T23:05:58.225" v="15"/>
+          <ac:picMkLst>
+            <pc:docMk/>
+            <pc:sldMk cId="974113834" sldId="256"/>
+            <ac:picMk id="32" creationId="{5D871B5C-C0CC-2049-8EE4-39B41344A9CA}"/>
+          </ac:picMkLst>
+        </pc:picChg>
+        <pc:picChg chg="mod">
+          <ac:chgData name="Bloom PhD, Jesse D" userId="e17e4af4-92ba-4f4f-89d8-f6d4f5501821" providerId="ADAL" clId="{AF750AC1-FCBC-C64B-9154-23FC45454528}" dt="2020-04-15T23:05:58.225" v="15"/>
+          <ac:picMkLst>
+            <pc:docMk/>
+            <pc:sldMk cId="974113834" sldId="256"/>
+            <ac:picMk id="44" creationId="{6938CE89-768D-164E-B27E-CF4A9D1AAD61}"/>
+          </ac:picMkLst>
+        </pc:picChg>
+        <pc:picChg chg="mod">
+          <ac:chgData name="Bloom PhD, Jesse D" userId="e17e4af4-92ba-4f4f-89d8-f6d4f5501821" providerId="ADAL" clId="{AF750AC1-FCBC-C64B-9154-23FC45454528}" dt="2020-04-15T23:05:58.225" v="15"/>
+          <ac:picMkLst>
+            <pc:docMk/>
+            <pc:sldMk cId="974113834" sldId="256"/>
+            <ac:picMk id="45" creationId="{2EE856AC-B332-7A48-B168-4BB3B775BACA}"/>
+          </ac:picMkLst>
+        </pc:picChg>
+        <pc:picChg chg="mod">
+          <ac:chgData name="Bloom PhD, Jesse D" userId="e17e4af4-92ba-4f4f-89d8-f6d4f5501821" providerId="ADAL" clId="{AF750AC1-FCBC-C64B-9154-23FC45454528}" dt="2020-04-15T23:05:58.225" v="15"/>
+          <ac:picMkLst>
+            <pc:docMk/>
+            <pc:sldMk cId="974113834" sldId="256"/>
+            <ac:picMk id="46" creationId="{A77CBC6A-223C-2640-8B45-9E709160E0EA}"/>
+          </ac:picMkLst>
+        </pc:picChg>
+        <pc:picChg chg="mod">
+          <ac:chgData name="Bloom PhD, Jesse D" userId="e17e4af4-92ba-4f4f-89d8-f6d4f5501821" providerId="ADAL" clId="{AF750AC1-FCBC-C64B-9154-23FC45454528}" dt="2020-04-15T23:05:58.225" v="15"/>
+          <ac:picMkLst>
+            <pc:docMk/>
+            <pc:sldMk cId="974113834" sldId="256"/>
+            <ac:picMk id="47" creationId="{9E902101-AC31-4248-B66C-4A1A8ECC4235}"/>
+          </ac:picMkLst>
+        </pc:picChg>
+        <pc:cxnChg chg="mod">
+          <ac:chgData name="Bloom PhD, Jesse D" userId="e17e4af4-92ba-4f4f-89d8-f6d4f5501821" providerId="ADAL" clId="{AF750AC1-FCBC-C64B-9154-23FC45454528}" dt="2020-04-15T23:04:46.353" v="3"/>
+          <ac:cxnSpMkLst>
+            <pc:docMk/>
+            <pc:sldMk cId="974113834" sldId="256"/>
+            <ac:cxnSpMk id="24" creationId="{38A14E00-71B6-6D46-9D40-51D4F935F9AA}"/>
+          </ac:cxnSpMkLst>
+        </pc:cxnChg>
+        <pc:cxnChg chg="mod">
+          <ac:chgData name="Bloom PhD, Jesse D" userId="e17e4af4-92ba-4f4f-89d8-f6d4f5501821" providerId="ADAL" clId="{AF750AC1-FCBC-C64B-9154-23FC45454528}" dt="2020-04-15T23:04:46.353" v="3"/>
+          <ac:cxnSpMkLst>
+            <pc:docMk/>
+            <pc:sldMk cId="974113834" sldId="256"/>
+            <ac:cxnSpMk id="25" creationId="{47FE99C0-8B07-1F4C-8775-05F4E31284B8}"/>
+          </ac:cxnSpMkLst>
+        </pc:cxnChg>
+        <pc:cxnChg chg="mod">
+          <ac:chgData name="Bloom PhD, Jesse D" userId="e17e4af4-92ba-4f4f-89d8-f6d4f5501821" providerId="ADAL" clId="{AF750AC1-FCBC-C64B-9154-23FC45454528}" dt="2020-04-15T23:05:58.225" v="15"/>
+          <ac:cxnSpMkLst>
+            <pc:docMk/>
+            <pc:sldMk cId="974113834" sldId="256"/>
+            <ac:cxnSpMk id="42" creationId="{EB481F3D-D960-4F4B-945C-E030E2BD7554}"/>
+          </ac:cxnSpMkLst>
+        </pc:cxnChg>
+        <pc:cxnChg chg="mod">
+          <ac:chgData name="Bloom PhD, Jesse D" userId="e17e4af4-92ba-4f4f-89d8-f6d4f5501821" providerId="ADAL" clId="{AF750AC1-FCBC-C64B-9154-23FC45454528}" dt="2020-04-15T23:05:58.225" v="15"/>
+          <ac:cxnSpMkLst>
+            <pc:docMk/>
+            <pc:sldMk cId="974113834" sldId="256"/>
+            <ac:cxnSpMk id="43" creationId="{6FF8CC19-ED2A-7649-B754-70CAB0ACE181}"/>
+          </ac:cxnSpMkLst>
+        </pc:cxnChg>
+      </pc:sldChg>
+      <pc:sldMasterChg chg="modSp modSldLayout">
+        <pc:chgData name="Bloom PhD, Jesse D" userId="e17e4af4-92ba-4f4f-89d8-f6d4f5501821" providerId="ADAL" clId="{AF750AC1-FCBC-C64B-9154-23FC45454528}" dt="2020-04-15T23:04:26.163" v="1"/>
+        <pc:sldMasterMkLst>
+          <pc:docMk/>
+          <pc:sldMasterMk cId="2195860230" sldId="2147483672"/>
+        </pc:sldMasterMkLst>
+        <pc:spChg chg="mod">
+          <ac:chgData name="Bloom PhD, Jesse D" userId="e17e4af4-92ba-4f4f-89d8-f6d4f5501821" providerId="ADAL" clId="{AF750AC1-FCBC-C64B-9154-23FC45454528}" dt="2020-04-15T23:04:26.163" v="1"/>
+          <ac:spMkLst>
+            <pc:docMk/>
+            <pc:sldMasterMk cId="2195860230" sldId="2147483672"/>
+            <ac:spMk id="2" creationId="{00000000-0000-0000-0000-000000000000}"/>
+          </ac:spMkLst>
+        </pc:spChg>
+        <pc:spChg chg="mod">
+          <ac:chgData name="Bloom PhD, Jesse D" userId="e17e4af4-92ba-4f4f-89d8-f6d4f5501821" providerId="ADAL" clId="{AF750AC1-FCBC-C64B-9154-23FC45454528}" dt="2020-04-15T23:04:26.163" v="1"/>
+          <ac:spMkLst>
+            <pc:docMk/>
+            <pc:sldMasterMk cId="2195860230" sldId="2147483672"/>
+            <ac:spMk id="3" creationId="{00000000-0000-0000-0000-000000000000}"/>
+          </ac:spMkLst>
+        </pc:spChg>
+        <pc:spChg chg="mod">
+          <ac:chgData name="Bloom PhD, Jesse D" userId="e17e4af4-92ba-4f4f-89d8-f6d4f5501821" providerId="ADAL" clId="{AF750AC1-FCBC-C64B-9154-23FC45454528}" dt="2020-04-15T23:04:26.163" v="1"/>
+          <ac:spMkLst>
+            <pc:docMk/>
+            <pc:sldMasterMk cId="2195860230" sldId="2147483672"/>
+            <ac:spMk id="4" creationId="{00000000-0000-0000-0000-000000000000}"/>
+          </ac:spMkLst>
+        </pc:spChg>
+        <pc:spChg chg="mod">
+          <ac:chgData name="Bloom PhD, Jesse D" userId="e17e4af4-92ba-4f4f-89d8-f6d4f5501821" providerId="ADAL" clId="{AF750AC1-FCBC-C64B-9154-23FC45454528}" dt="2020-04-15T23:04:26.163" v="1"/>
+          <ac:spMkLst>
+            <pc:docMk/>
+            <pc:sldMasterMk cId="2195860230" sldId="2147483672"/>
+            <ac:spMk id="5" creationId="{00000000-0000-0000-0000-000000000000}"/>
+          </ac:spMkLst>
+        </pc:spChg>
+        <pc:spChg chg="mod">
+          <ac:chgData name="Bloom PhD, Jesse D" userId="e17e4af4-92ba-4f4f-89d8-f6d4f5501821" providerId="ADAL" clId="{AF750AC1-FCBC-C64B-9154-23FC45454528}" dt="2020-04-15T23:04:26.163" v="1"/>
+          <ac:spMkLst>
+            <pc:docMk/>
+            <pc:sldMasterMk cId="2195860230" sldId="2147483672"/>
+            <ac:spMk id="6" creationId="{00000000-0000-0000-0000-000000000000}"/>
+          </ac:spMkLst>
+        </pc:spChg>
+        <pc:sldLayoutChg chg="modSp">
+          <pc:chgData name="Bloom PhD, Jesse D" userId="e17e4af4-92ba-4f4f-89d8-f6d4f5501821" providerId="ADAL" clId="{AF750AC1-FCBC-C64B-9154-23FC45454528}" dt="2020-04-15T23:04:26.163" v="1"/>
+          <pc:sldLayoutMkLst>
+            <pc:docMk/>
+            <pc:sldMasterMk cId="2195860230" sldId="2147483672"/>
+            <pc:sldLayoutMk cId="2128635893" sldId="2147483673"/>
+          </pc:sldLayoutMkLst>
+          <pc:spChg chg="mod">
+            <ac:chgData name="Bloom PhD, Jesse D" userId="e17e4af4-92ba-4f4f-89d8-f6d4f5501821" providerId="ADAL" clId="{AF750AC1-FCBC-C64B-9154-23FC45454528}" dt="2020-04-15T23:04:26.163" v="1"/>
+            <ac:spMkLst>
+              <pc:docMk/>
+              <pc:sldMasterMk cId="2195860230" sldId="2147483672"/>
+              <pc:sldLayoutMk cId="2128635893" sldId="2147483673"/>
+              <ac:spMk id="2" creationId="{00000000-0000-0000-0000-000000000000}"/>
+            </ac:spMkLst>
+          </pc:spChg>
+          <pc:spChg chg="mod">
+            <ac:chgData name="Bloom PhD, Jesse D" userId="e17e4af4-92ba-4f4f-89d8-f6d4f5501821" providerId="ADAL" clId="{AF750AC1-FCBC-C64B-9154-23FC45454528}" dt="2020-04-15T23:04:26.163" v="1"/>
+            <ac:spMkLst>
+              <pc:docMk/>
+              <pc:sldMasterMk cId="2195860230" sldId="2147483672"/>
+              <pc:sldLayoutMk cId="2128635893" sldId="2147483673"/>
+              <ac:spMk id="3" creationId="{00000000-0000-0000-0000-000000000000}"/>
+            </ac:spMkLst>
+          </pc:spChg>
+        </pc:sldLayoutChg>
+        <pc:sldLayoutChg chg="modSp">
+          <pc:chgData name="Bloom PhD, Jesse D" userId="e17e4af4-92ba-4f4f-89d8-f6d4f5501821" providerId="ADAL" clId="{AF750AC1-FCBC-C64B-9154-23FC45454528}" dt="2020-04-15T23:04:26.163" v="1"/>
+          <pc:sldLayoutMkLst>
+            <pc:docMk/>
+            <pc:sldMasterMk cId="2195860230" sldId="2147483672"/>
+            <pc:sldLayoutMk cId="4203870080" sldId="2147483675"/>
+          </pc:sldLayoutMkLst>
+          <pc:spChg chg="mod">
+            <ac:chgData name="Bloom PhD, Jesse D" userId="e17e4af4-92ba-4f4f-89d8-f6d4f5501821" providerId="ADAL" clId="{AF750AC1-FCBC-C64B-9154-23FC45454528}" dt="2020-04-15T23:04:26.163" v="1"/>
+            <ac:spMkLst>
+              <pc:docMk/>
+              <pc:sldMasterMk cId="2195860230" sldId="2147483672"/>
+              <pc:sldLayoutMk cId="4203870080" sldId="2147483675"/>
+              <ac:spMk id="2" creationId="{00000000-0000-0000-0000-000000000000}"/>
+            </ac:spMkLst>
+          </pc:spChg>
+          <pc:spChg chg="mod">
+            <ac:chgData name="Bloom PhD, Jesse D" userId="e17e4af4-92ba-4f4f-89d8-f6d4f5501821" providerId="ADAL" clId="{AF750AC1-FCBC-C64B-9154-23FC45454528}" dt="2020-04-15T23:04:26.163" v="1"/>
+            <ac:spMkLst>
+              <pc:docMk/>
+              <pc:sldMasterMk cId="2195860230" sldId="2147483672"/>
+              <pc:sldLayoutMk cId="4203870080" sldId="2147483675"/>
+              <ac:spMk id="3" creationId="{00000000-0000-0000-0000-000000000000}"/>
+            </ac:spMkLst>
+          </pc:spChg>
+        </pc:sldLayoutChg>
+        <pc:sldLayoutChg chg="modSp">
+          <pc:chgData name="Bloom PhD, Jesse D" userId="e17e4af4-92ba-4f4f-89d8-f6d4f5501821" providerId="ADAL" clId="{AF750AC1-FCBC-C64B-9154-23FC45454528}" dt="2020-04-15T23:04:26.163" v="1"/>
+          <pc:sldLayoutMkLst>
+            <pc:docMk/>
+            <pc:sldMasterMk cId="2195860230" sldId="2147483672"/>
+            <pc:sldLayoutMk cId="2952863145" sldId="2147483676"/>
+          </pc:sldLayoutMkLst>
+          <pc:spChg chg="mod">
+            <ac:chgData name="Bloom PhD, Jesse D" userId="e17e4af4-92ba-4f4f-89d8-f6d4f5501821" providerId="ADAL" clId="{AF750AC1-FCBC-C64B-9154-23FC45454528}" dt="2020-04-15T23:04:26.163" v="1"/>
+            <ac:spMkLst>
+              <pc:docMk/>
+              <pc:sldMasterMk cId="2195860230" sldId="2147483672"/>
+              <pc:sldLayoutMk cId="2952863145" sldId="2147483676"/>
+              <ac:spMk id="3" creationId="{00000000-0000-0000-0000-000000000000}"/>
+            </ac:spMkLst>
+          </pc:spChg>
+          <pc:spChg chg="mod">
+            <ac:chgData name="Bloom PhD, Jesse D" userId="e17e4af4-92ba-4f4f-89d8-f6d4f5501821" providerId="ADAL" clId="{AF750AC1-FCBC-C64B-9154-23FC45454528}" dt="2020-04-15T23:04:26.163" v="1"/>
+            <ac:spMkLst>
+              <pc:docMk/>
+              <pc:sldMasterMk cId="2195860230" sldId="2147483672"/>
+              <pc:sldLayoutMk cId="2952863145" sldId="2147483676"/>
+              <ac:spMk id="4" creationId="{00000000-0000-0000-0000-000000000000}"/>
+            </ac:spMkLst>
+          </pc:spChg>
+        </pc:sldLayoutChg>
+        <pc:sldLayoutChg chg="modSp">
+          <pc:chgData name="Bloom PhD, Jesse D" userId="e17e4af4-92ba-4f4f-89d8-f6d4f5501821" providerId="ADAL" clId="{AF750AC1-FCBC-C64B-9154-23FC45454528}" dt="2020-04-15T23:04:26.163" v="1"/>
+          <pc:sldLayoutMkLst>
+            <pc:docMk/>
+            <pc:sldMasterMk cId="2195860230" sldId="2147483672"/>
+            <pc:sldLayoutMk cId="948441193" sldId="2147483677"/>
+          </pc:sldLayoutMkLst>
+          <pc:spChg chg="mod">
+            <ac:chgData name="Bloom PhD, Jesse D" userId="e17e4af4-92ba-4f4f-89d8-f6d4f5501821" providerId="ADAL" clId="{AF750AC1-FCBC-C64B-9154-23FC45454528}" dt="2020-04-15T23:04:26.163" v="1"/>
+            <ac:spMkLst>
+              <pc:docMk/>
+              <pc:sldMasterMk cId="2195860230" sldId="2147483672"/>
+              <pc:sldLayoutMk cId="948441193" sldId="2147483677"/>
+              <ac:spMk id="2" creationId="{00000000-0000-0000-0000-000000000000}"/>
+            </ac:spMkLst>
+          </pc:spChg>
+          <pc:spChg chg="mod">
+            <ac:chgData name="Bloom PhD, Jesse D" userId="e17e4af4-92ba-4f4f-89d8-f6d4f5501821" providerId="ADAL" clId="{AF750AC1-FCBC-C64B-9154-23FC45454528}" dt="2020-04-15T23:04:26.163" v="1"/>
+            <ac:spMkLst>
+              <pc:docMk/>
+              <pc:sldMasterMk cId="2195860230" sldId="2147483672"/>
+              <pc:sldLayoutMk cId="948441193" sldId="2147483677"/>
+              <ac:spMk id="3" creationId="{00000000-0000-0000-0000-000000000000}"/>
+            </ac:spMkLst>
+          </pc:spChg>
+          <pc:spChg chg="mod">
+            <ac:chgData name="Bloom PhD, Jesse D" userId="e17e4af4-92ba-4f4f-89d8-f6d4f5501821" providerId="ADAL" clId="{AF750AC1-FCBC-C64B-9154-23FC45454528}" dt="2020-04-15T23:04:26.163" v="1"/>
+            <ac:spMkLst>
+              <pc:docMk/>
+              <pc:sldMasterMk cId="2195860230" sldId="2147483672"/>
+              <pc:sldLayoutMk cId="948441193" sldId="2147483677"/>
+              <ac:spMk id="4" creationId="{00000000-0000-0000-0000-000000000000}"/>
+            </ac:spMkLst>
+          </pc:spChg>
+          <pc:spChg chg="mod">
+            <ac:chgData name="Bloom PhD, Jesse D" userId="e17e4af4-92ba-4f4f-89d8-f6d4f5501821" providerId="ADAL" clId="{AF750AC1-FCBC-C64B-9154-23FC45454528}" dt="2020-04-15T23:04:26.163" v="1"/>
+            <ac:spMkLst>
+              <pc:docMk/>
+              <pc:sldMasterMk cId="2195860230" sldId="2147483672"/>
+              <pc:sldLayoutMk cId="948441193" sldId="2147483677"/>
+              <ac:spMk id="5" creationId="{00000000-0000-0000-0000-000000000000}"/>
+            </ac:spMkLst>
+          </pc:spChg>
+          <pc:spChg chg="mod">
+            <ac:chgData name="Bloom PhD, Jesse D" userId="e17e4af4-92ba-4f4f-89d8-f6d4f5501821" providerId="ADAL" clId="{AF750AC1-FCBC-C64B-9154-23FC45454528}" dt="2020-04-15T23:04:26.163" v="1"/>
+            <ac:spMkLst>
+              <pc:docMk/>
+              <pc:sldMasterMk cId="2195860230" sldId="2147483672"/>
+              <pc:sldLayoutMk cId="948441193" sldId="2147483677"/>
+              <ac:spMk id="6" creationId="{00000000-0000-0000-0000-000000000000}"/>
+            </ac:spMkLst>
+          </pc:spChg>
+        </pc:sldLayoutChg>
+        <pc:sldLayoutChg chg="modSp">
+          <pc:chgData name="Bloom PhD, Jesse D" userId="e17e4af4-92ba-4f4f-89d8-f6d4f5501821" providerId="ADAL" clId="{AF750AC1-FCBC-C64B-9154-23FC45454528}" dt="2020-04-15T23:04:26.163" v="1"/>
+          <pc:sldLayoutMkLst>
+            <pc:docMk/>
+            <pc:sldMasterMk cId="2195860230" sldId="2147483672"/>
+            <pc:sldLayoutMk cId="2321398093" sldId="2147483680"/>
+          </pc:sldLayoutMkLst>
+          <pc:spChg chg="mod">
+            <ac:chgData name="Bloom PhD, Jesse D" userId="e17e4af4-92ba-4f4f-89d8-f6d4f5501821" providerId="ADAL" clId="{AF750AC1-FCBC-C64B-9154-23FC45454528}" dt="2020-04-15T23:04:26.163" v="1"/>
+            <ac:spMkLst>
+              <pc:docMk/>
+              <pc:sldMasterMk cId="2195860230" sldId="2147483672"/>
+              <pc:sldLayoutMk cId="2321398093" sldId="2147483680"/>
+              <ac:spMk id="2" creationId="{00000000-0000-0000-0000-000000000000}"/>
+            </ac:spMkLst>
+          </pc:spChg>
+          <pc:spChg chg="mod">
+            <ac:chgData name="Bloom PhD, Jesse D" userId="e17e4af4-92ba-4f4f-89d8-f6d4f5501821" providerId="ADAL" clId="{AF750AC1-FCBC-C64B-9154-23FC45454528}" dt="2020-04-15T23:04:26.163" v="1"/>
+            <ac:spMkLst>
+              <pc:docMk/>
+              <pc:sldMasterMk cId="2195860230" sldId="2147483672"/>
+              <pc:sldLayoutMk cId="2321398093" sldId="2147483680"/>
+              <ac:spMk id="3" creationId="{00000000-0000-0000-0000-000000000000}"/>
+            </ac:spMkLst>
+          </pc:spChg>
+          <pc:spChg chg="mod">
+            <ac:chgData name="Bloom PhD, Jesse D" userId="e17e4af4-92ba-4f4f-89d8-f6d4f5501821" providerId="ADAL" clId="{AF750AC1-FCBC-C64B-9154-23FC45454528}" dt="2020-04-15T23:04:26.163" v="1"/>
+            <ac:spMkLst>
+              <pc:docMk/>
+              <pc:sldMasterMk cId="2195860230" sldId="2147483672"/>
+              <pc:sldLayoutMk cId="2321398093" sldId="2147483680"/>
+              <ac:spMk id="4" creationId="{00000000-0000-0000-0000-000000000000}"/>
+            </ac:spMkLst>
+          </pc:spChg>
+        </pc:sldLayoutChg>
+        <pc:sldLayoutChg chg="modSp">
+          <pc:chgData name="Bloom PhD, Jesse D" userId="e17e4af4-92ba-4f4f-89d8-f6d4f5501821" providerId="ADAL" clId="{AF750AC1-FCBC-C64B-9154-23FC45454528}" dt="2020-04-15T23:04:26.163" v="1"/>
+          <pc:sldLayoutMkLst>
+            <pc:docMk/>
+            <pc:sldMasterMk cId="2195860230" sldId="2147483672"/>
+            <pc:sldLayoutMk cId="1943146970" sldId="2147483681"/>
+          </pc:sldLayoutMkLst>
+          <pc:spChg chg="mod">
+            <ac:chgData name="Bloom PhD, Jesse D" userId="e17e4af4-92ba-4f4f-89d8-f6d4f5501821" providerId="ADAL" clId="{AF750AC1-FCBC-C64B-9154-23FC45454528}" dt="2020-04-15T23:04:26.163" v="1"/>
+            <ac:spMkLst>
+              <pc:docMk/>
+              <pc:sldMasterMk cId="2195860230" sldId="2147483672"/>
+              <pc:sldLayoutMk cId="1943146970" sldId="2147483681"/>
+              <ac:spMk id="2" creationId="{00000000-0000-0000-0000-000000000000}"/>
+            </ac:spMkLst>
+          </pc:spChg>
+          <pc:spChg chg="mod">
+            <ac:chgData name="Bloom PhD, Jesse D" userId="e17e4af4-92ba-4f4f-89d8-f6d4f5501821" providerId="ADAL" clId="{AF750AC1-FCBC-C64B-9154-23FC45454528}" dt="2020-04-15T23:04:26.163" v="1"/>
+            <ac:spMkLst>
+              <pc:docMk/>
+              <pc:sldMasterMk cId="2195860230" sldId="2147483672"/>
+              <pc:sldLayoutMk cId="1943146970" sldId="2147483681"/>
+              <ac:spMk id="3" creationId="{00000000-0000-0000-0000-000000000000}"/>
+            </ac:spMkLst>
+          </pc:spChg>
+          <pc:spChg chg="mod">
+            <ac:chgData name="Bloom PhD, Jesse D" userId="e17e4af4-92ba-4f4f-89d8-f6d4f5501821" providerId="ADAL" clId="{AF750AC1-FCBC-C64B-9154-23FC45454528}" dt="2020-04-15T23:04:26.163" v="1"/>
+            <ac:spMkLst>
+              <pc:docMk/>
+              <pc:sldMasterMk cId="2195860230" sldId="2147483672"/>
+              <pc:sldLayoutMk cId="1943146970" sldId="2147483681"/>
+              <ac:spMk id="4" creationId="{00000000-0000-0000-0000-000000000000}"/>
+            </ac:spMkLst>
+          </pc:spChg>
+        </pc:sldLayoutChg>
+        <pc:sldLayoutChg chg="modSp">
+          <pc:chgData name="Bloom PhD, Jesse D" userId="e17e4af4-92ba-4f4f-89d8-f6d4f5501821" providerId="ADAL" clId="{AF750AC1-FCBC-C64B-9154-23FC45454528}" dt="2020-04-15T23:04:26.163" v="1"/>
+          <pc:sldLayoutMkLst>
+            <pc:docMk/>
+            <pc:sldMasterMk cId="2195860230" sldId="2147483672"/>
+            <pc:sldLayoutMk cId="1575578545" sldId="2147483683"/>
+          </pc:sldLayoutMkLst>
+          <pc:spChg chg="mod">
+            <ac:chgData name="Bloom PhD, Jesse D" userId="e17e4af4-92ba-4f4f-89d8-f6d4f5501821" providerId="ADAL" clId="{AF750AC1-FCBC-C64B-9154-23FC45454528}" dt="2020-04-15T23:04:26.163" v="1"/>
+            <ac:spMkLst>
+              <pc:docMk/>
+              <pc:sldMasterMk cId="2195860230" sldId="2147483672"/>
+              <pc:sldLayoutMk cId="1575578545" sldId="2147483683"/>
+              <ac:spMk id="2" creationId="{00000000-0000-0000-0000-000000000000}"/>
+            </ac:spMkLst>
+          </pc:spChg>
+          <pc:spChg chg="mod">
+            <ac:chgData name="Bloom PhD, Jesse D" userId="e17e4af4-92ba-4f4f-89d8-f6d4f5501821" providerId="ADAL" clId="{AF750AC1-FCBC-C64B-9154-23FC45454528}" dt="2020-04-15T23:04:26.163" v="1"/>
+            <ac:spMkLst>
+              <pc:docMk/>
+              <pc:sldMasterMk cId="2195860230" sldId="2147483672"/>
+              <pc:sldLayoutMk cId="1575578545" sldId="2147483683"/>
+              <ac:spMk id="3" creationId="{00000000-0000-0000-0000-000000000000}"/>
+            </ac:spMkLst>
+          </pc:spChg>
+        </pc:sldLayoutChg>
+      </pc:sldMasterChg>
+      <pc:sldMasterChg chg="modSp modSldLayout">
+        <pc:chgData name="Bloom PhD, Jesse D" userId="e17e4af4-92ba-4f4f-89d8-f6d4f5501821" providerId="ADAL" clId="{AF750AC1-FCBC-C64B-9154-23FC45454528}" dt="2020-04-15T23:05:56.292" v="14"/>
+        <pc:sldMasterMkLst>
+          <pc:docMk/>
+          <pc:sldMasterMk cId="2769565298" sldId="2147483684"/>
+        </pc:sldMasterMkLst>
+        <pc:spChg chg="mod">
+          <ac:chgData name="Bloom PhD, Jesse D" userId="e17e4af4-92ba-4f4f-89d8-f6d4f5501821" providerId="ADAL" clId="{AF750AC1-FCBC-C64B-9154-23FC45454528}" dt="2020-04-15T23:05:56.292" v="14"/>
+          <ac:spMkLst>
+            <pc:docMk/>
+            <pc:sldMasterMk cId="2769565298" sldId="2147483684"/>
+            <ac:spMk id="2" creationId="{00000000-0000-0000-0000-000000000000}"/>
+          </ac:spMkLst>
+        </pc:spChg>
+        <pc:spChg chg="mod">
+          <ac:chgData name="Bloom PhD, Jesse D" userId="e17e4af4-92ba-4f4f-89d8-f6d4f5501821" providerId="ADAL" clId="{AF750AC1-FCBC-C64B-9154-23FC45454528}" dt="2020-04-15T23:05:56.292" v="14"/>
+          <ac:spMkLst>
+            <pc:docMk/>
+            <pc:sldMasterMk cId="2769565298" sldId="2147483684"/>
+            <ac:spMk id="3" creationId="{00000000-0000-0000-0000-000000000000}"/>
+          </ac:spMkLst>
+        </pc:spChg>
+        <pc:spChg chg="mod">
+          <ac:chgData name="Bloom PhD, Jesse D" userId="e17e4af4-92ba-4f4f-89d8-f6d4f5501821" providerId="ADAL" clId="{AF750AC1-FCBC-C64B-9154-23FC45454528}" dt="2020-04-15T23:05:56.292" v="14"/>
+          <ac:spMkLst>
+            <pc:docMk/>
+            <pc:sldMasterMk cId="2769565298" sldId="2147483684"/>
+            <ac:spMk id="4" creationId="{00000000-0000-0000-0000-000000000000}"/>
+          </ac:spMkLst>
+        </pc:spChg>
+        <pc:spChg chg="mod">
+          <ac:chgData name="Bloom PhD, Jesse D" userId="e17e4af4-92ba-4f4f-89d8-f6d4f5501821" providerId="ADAL" clId="{AF750AC1-FCBC-C64B-9154-23FC45454528}" dt="2020-04-15T23:05:56.292" v="14"/>
+          <ac:spMkLst>
+            <pc:docMk/>
+            <pc:sldMasterMk cId="2769565298" sldId="2147483684"/>
+            <ac:spMk id="5" creationId="{00000000-0000-0000-0000-000000000000}"/>
+          </ac:spMkLst>
+        </pc:spChg>
+        <pc:spChg chg="mod">
+          <ac:chgData name="Bloom PhD, Jesse D" userId="e17e4af4-92ba-4f4f-89d8-f6d4f5501821" providerId="ADAL" clId="{AF750AC1-FCBC-C64B-9154-23FC45454528}" dt="2020-04-15T23:05:56.292" v="14"/>
+          <ac:spMkLst>
+            <pc:docMk/>
+            <pc:sldMasterMk cId="2769565298" sldId="2147483684"/>
+            <ac:spMk id="6" creationId="{00000000-0000-0000-0000-000000000000}"/>
+          </ac:spMkLst>
+        </pc:spChg>
+        <pc:sldLayoutChg chg="modSp">
+          <pc:chgData name="Bloom PhD, Jesse D" userId="e17e4af4-92ba-4f4f-89d8-f6d4f5501821" providerId="ADAL" clId="{AF750AC1-FCBC-C64B-9154-23FC45454528}" dt="2020-04-15T23:05:56.292" v="14"/>
+          <pc:sldLayoutMkLst>
+            <pc:docMk/>
+            <pc:sldMasterMk cId="2769565298" sldId="2147483684"/>
+            <pc:sldLayoutMk cId="3341845373" sldId="2147483685"/>
+          </pc:sldLayoutMkLst>
+          <pc:spChg chg="mod">
+            <ac:chgData name="Bloom PhD, Jesse D" userId="e17e4af4-92ba-4f4f-89d8-f6d4f5501821" providerId="ADAL" clId="{AF750AC1-FCBC-C64B-9154-23FC45454528}" dt="2020-04-15T23:05:56.292" v="14"/>
+            <ac:spMkLst>
+              <pc:docMk/>
+              <pc:sldMasterMk cId="2769565298" sldId="2147483684"/>
+              <pc:sldLayoutMk cId="3341845373" sldId="2147483685"/>
+              <ac:spMk id="2" creationId="{00000000-0000-0000-0000-000000000000}"/>
+            </ac:spMkLst>
+          </pc:spChg>
+          <pc:spChg chg="mod">
+            <ac:chgData name="Bloom PhD, Jesse D" userId="e17e4af4-92ba-4f4f-89d8-f6d4f5501821" providerId="ADAL" clId="{AF750AC1-FCBC-C64B-9154-23FC45454528}" dt="2020-04-15T23:05:56.292" v="14"/>
+            <ac:spMkLst>
+              <pc:docMk/>
+              <pc:sldMasterMk cId="2769565298" sldId="2147483684"/>
+              <pc:sldLayoutMk cId="3341845373" sldId="2147483685"/>
+              <ac:spMk id="3" creationId="{00000000-0000-0000-0000-000000000000}"/>
+            </ac:spMkLst>
+          </pc:spChg>
+        </pc:sldLayoutChg>
+        <pc:sldLayoutChg chg="modSp">
+          <pc:chgData name="Bloom PhD, Jesse D" userId="e17e4af4-92ba-4f4f-89d8-f6d4f5501821" providerId="ADAL" clId="{AF750AC1-FCBC-C64B-9154-23FC45454528}" dt="2020-04-15T23:05:56.292" v="14"/>
+          <pc:sldLayoutMkLst>
+            <pc:docMk/>
+            <pc:sldMasterMk cId="2769565298" sldId="2147483684"/>
+            <pc:sldLayoutMk cId="3451689352" sldId="2147483687"/>
+          </pc:sldLayoutMkLst>
+          <pc:spChg chg="mod">
+            <ac:chgData name="Bloom PhD, Jesse D" userId="e17e4af4-92ba-4f4f-89d8-f6d4f5501821" providerId="ADAL" clId="{AF750AC1-FCBC-C64B-9154-23FC45454528}" dt="2020-04-15T23:05:56.292" v="14"/>
+            <ac:spMkLst>
+              <pc:docMk/>
+              <pc:sldMasterMk cId="2769565298" sldId="2147483684"/>
+              <pc:sldLayoutMk cId="3451689352" sldId="2147483687"/>
+              <ac:spMk id="2" creationId="{00000000-0000-0000-0000-000000000000}"/>
+            </ac:spMkLst>
+          </pc:spChg>
+          <pc:spChg chg="mod">
+            <ac:chgData name="Bloom PhD, Jesse D" userId="e17e4af4-92ba-4f4f-89d8-f6d4f5501821" providerId="ADAL" clId="{AF750AC1-FCBC-C64B-9154-23FC45454528}" dt="2020-04-15T23:05:56.292" v="14"/>
+            <ac:spMkLst>
+              <pc:docMk/>
+              <pc:sldMasterMk cId="2769565298" sldId="2147483684"/>
+              <pc:sldLayoutMk cId="3451689352" sldId="2147483687"/>
+              <ac:spMk id="3" creationId="{00000000-0000-0000-0000-000000000000}"/>
+            </ac:spMkLst>
+          </pc:spChg>
+        </pc:sldLayoutChg>
+        <pc:sldLayoutChg chg="modSp">
+          <pc:chgData name="Bloom PhD, Jesse D" userId="e17e4af4-92ba-4f4f-89d8-f6d4f5501821" providerId="ADAL" clId="{AF750AC1-FCBC-C64B-9154-23FC45454528}" dt="2020-04-15T23:05:56.292" v="14"/>
+          <pc:sldLayoutMkLst>
+            <pc:docMk/>
+            <pc:sldMasterMk cId="2769565298" sldId="2147483684"/>
+            <pc:sldLayoutMk cId="1096745119" sldId="2147483688"/>
+          </pc:sldLayoutMkLst>
+          <pc:spChg chg="mod">
+            <ac:chgData name="Bloom PhD, Jesse D" userId="e17e4af4-92ba-4f4f-89d8-f6d4f5501821" providerId="ADAL" clId="{AF750AC1-FCBC-C64B-9154-23FC45454528}" dt="2020-04-15T23:05:56.292" v="14"/>
+            <ac:spMkLst>
+              <pc:docMk/>
+              <pc:sldMasterMk cId="2769565298" sldId="2147483684"/>
+              <pc:sldLayoutMk cId="1096745119" sldId="2147483688"/>
+              <ac:spMk id="3" creationId="{00000000-0000-0000-0000-000000000000}"/>
+            </ac:spMkLst>
+          </pc:spChg>
+          <pc:spChg chg="mod">
+            <ac:chgData name="Bloom PhD, Jesse D" userId="e17e4af4-92ba-4f4f-89d8-f6d4f5501821" providerId="ADAL" clId="{AF750AC1-FCBC-C64B-9154-23FC45454528}" dt="2020-04-15T23:05:56.292" v="14"/>
+            <ac:spMkLst>
+              <pc:docMk/>
+              <pc:sldMasterMk cId="2769565298" sldId="2147483684"/>
+              <pc:sldLayoutMk cId="1096745119" sldId="2147483688"/>
+              <ac:spMk id="4" creationId="{00000000-0000-0000-0000-000000000000}"/>
+            </ac:spMkLst>
+          </pc:spChg>
+        </pc:sldLayoutChg>
+        <pc:sldLayoutChg chg="modSp">
+          <pc:chgData name="Bloom PhD, Jesse D" userId="e17e4af4-92ba-4f4f-89d8-f6d4f5501821" providerId="ADAL" clId="{AF750AC1-FCBC-C64B-9154-23FC45454528}" dt="2020-04-15T23:05:56.292" v="14"/>
+          <pc:sldLayoutMkLst>
+            <pc:docMk/>
+            <pc:sldMasterMk cId="2769565298" sldId="2147483684"/>
+            <pc:sldLayoutMk cId="61454804" sldId="2147483689"/>
+          </pc:sldLayoutMkLst>
+          <pc:spChg chg="mod">
+            <ac:chgData name="Bloom PhD, Jesse D" userId="e17e4af4-92ba-4f4f-89d8-f6d4f5501821" providerId="ADAL" clId="{AF750AC1-FCBC-C64B-9154-23FC45454528}" dt="2020-04-15T23:05:56.292" v="14"/>
+            <ac:spMkLst>
+              <pc:docMk/>
+              <pc:sldMasterMk cId="2769565298" sldId="2147483684"/>
+              <pc:sldLayoutMk cId="61454804" sldId="2147483689"/>
+              <ac:spMk id="2" creationId="{00000000-0000-0000-0000-000000000000}"/>
+            </ac:spMkLst>
+          </pc:spChg>
+          <pc:spChg chg="mod">
+            <ac:chgData name="Bloom PhD, Jesse D" userId="e17e4af4-92ba-4f4f-89d8-f6d4f5501821" providerId="ADAL" clId="{AF750AC1-FCBC-C64B-9154-23FC45454528}" dt="2020-04-15T23:05:56.292" v="14"/>
+            <ac:spMkLst>
+              <pc:docMk/>
+              <pc:sldMasterMk cId="2769565298" sldId="2147483684"/>
+              <pc:sldLayoutMk cId="61454804" sldId="2147483689"/>
+              <ac:spMk id="3" creationId="{00000000-0000-0000-0000-000000000000}"/>
+            </ac:spMkLst>
+          </pc:spChg>
+          <pc:spChg chg="mod">
+            <ac:chgData name="Bloom PhD, Jesse D" userId="e17e4af4-92ba-4f4f-89d8-f6d4f5501821" providerId="ADAL" clId="{AF750AC1-FCBC-C64B-9154-23FC45454528}" dt="2020-04-15T23:05:56.292" v="14"/>
+            <ac:spMkLst>
+              <pc:docMk/>
+              <pc:sldMasterMk cId="2769565298" sldId="2147483684"/>
+              <pc:sldLayoutMk cId="61454804" sldId="2147483689"/>
+              <ac:spMk id="4" creationId="{00000000-0000-0000-0000-000000000000}"/>
+            </ac:spMkLst>
+          </pc:spChg>
+          <pc:spChg chg="mod">
+            <ac:chgData name="Bloom PhD, Jesse D" userId="e17e4af4-92ba-4f4f-89d8-f6d4f5501821" providerId="ADAL" clId="{AF750AC1-FCBC-C64B-9154-23FC45454528}" dt="2020-04-15T23:05:56.292" v="14"/>
+            <ac:spMkLst>
+              <pc:docMk/>
+              <pc:sldMasterMk cId="2769565298" sldId="2147483684"/>
+              <pc:sldLayoutMk cId="61454804" sldId="2147483689"/>
+              <ac:spMk id="5" creationId="{00000000-0000-0000-0000-000000000000}"/>
+            </ac:spMkLst>
+          </pc:spChg>
+          <pc:spChg chg="mod">
+            <ac:chgData name="Bloom PhD, Jesse D" userId="e17e4af4-92ba-4f4f-89d8-f6d4f5501821" providerId="ADAL" clId="{AF750AC1-FCBC-C64B-9154-23FC45454528}" dt="2020-04-15T23:05:56.292" v="14"/>
+            <ac:spMkLst>
+              <pc:docMk/>
+              <pc:sldMasterMk cId="2769565298" sldId="2147483684"/>
+              <pc:sldLayoutMk cId="61454804" sldId="2147483689"/>
+              <ac:spMk id="6" creationId="{00000000-0000-0000-0000-000000000000}"/>
+            </ac:spMkLst>
+          </pc:spChg>
+        </pc:sldLayoutChg>
+        <pc:sldLayoutChg chg="modSp">
+          <pc:chgData name="Bloom PhD, Jesse D" userId="e17e4af4-92ba-4f4f-89d8-f6d4f5501821" providerId="ADAL" clId="{AF750AC1-FCBC-C64B-9154-23FC45454528}" dt="2020-04-15T23:05:56.292" v="14"/>
+          <pc:sldLayoutMkLst>
+            <pc:docMk/>
+            <pc:sldMasterMk cId="2769565298" sldId="2147483684"/>
+            <pc:sldLayoutMk cId="3720717948" sldId="2147483692"/>
+          </pc:sldLayoutMkLst>
+          <pc:spChg chg="mod">
+            <ac:chgData name="Bloom PhD, Jesse D" userId="e17e4af4-92ba-4f4f-89d8-f6d4f5501821" providerId="ADAL" clId="{AF750AC1-FCBC-C64B-9154-23FC45454528}" dt="2020-04-15T23:05:56.292" v="14"/>
+            <ac:spMkLst>
+              <pc:docMk/>
+              <pc:sldMasterMk cId="2769565298" sldId="2147483684"/>
+              <pc:sldLayoutMk cId="3720717948" sldId="2147483692"/>
+              <ac:spMk id="2" creationId="{00000000-0000-0000-0000-000000000000}"/>
+            </ac:spMkLst>
+          </pc:spChg>
+          <pc:spChg chg="mod">
+            <ac:chgData name="Bloom PhD, Jesse D" userId="e17e4af4-92ba-4f4f-89d8-f6d4f5501821" providerId="ADAL" clId="{AF750AC1-FCBC-C64B-9154-23FC45454528}" dt="2020-04-15T23:05:56.292" v="14"/>
+            <ac:spMkLst>
+              <pc:docMk/>
+              <pc:sldMasterMk cId="2769565298" sldId="2147483684"/>
+              <pc:sldLayoutMk cId="3720717948" sldId="2147483692"/>
+              <ac:spMk id="3" creationId="{00000000-0000-0000-0000-000000000000}"/>
+            </ac:spMkLst>
+          </pc:spChg>
+          <pc:spChg chg="mod">
+            <ac:chgData name="Bloom PhD, Jesse D" userId="e17e4af4-92ba-4f4f-89d8-f6d4f5501821" providerId="ADAL" clId="{AF750AC1-FCBC-C64B-9154-23FC45454528}" dt="2020-04-15T23:05:56.292" v="14"/>
+            <ac:spMkLst>
+              <pc:docMk/>
+              <pc:sldMasterMk cId="2769565298" sldId="2147483684"/>
+              <pc:sldLayoutMk cId="3720717948" sldId="2147483692"/>
+              <ac:spMk id="4" creationId="{00000000-0000-0000-0000-000000000000}"/>
+            </ac:spMkLst>
+          </pc:spChg>
+        </pc:sldLayoutChg>
+        <pc:sldLayoutChg chg="modSp">
+          <pc:chgData name="Bloom PhD, Jesse D" userId="e17e4af4-92ba-4f4f-89d8-f6d4f5501821" providerId="ADAL" clId="{AF750AC1-FCBC-C64B-9154-23FC45454528}" dt="2020-04-15T23:05:56.292" v="14"/>
+          <pc:sldLayoutMkLst>
+            <pc:docMk/>
+            <pc:sldMasterMk cId="2769565298" sldId="2147483684"/>
+            <pc:sldLayoutMk cId="3686889034" sldId="2147483693"/>
+          </pc:sldLayoutMkLst>
+          <pc:spChg chg="mod">
+            <ac:chgData name="Bloom PhD, Jesse D" userId="e17e4af4-92ba-4f4f-89d8-f6d4f5501821" providerId="ADAL" clId="{AF750AC1-FCBC-C64B-9154-23FC45454528}" dt="2020-04-15T23:05:56.292" v="14"/>
+            <ac:spMkLst>
+              <pc:docMk/>
+              <pc:sldMasterMk cId="2769565298" sldId="2147483684"/>
+              <pc:sldLayoutMk cId="3686889034" sldId="2147483693"/>
+              <ac:spMk id="2" creationId="{00000000-0000-0000-0000-000000000000}"/>
+            </ac:spMkLst>
+          </pc:spChg>
+          <pc:spChg chg="mod">
+            <ac:chgData name="Bloom PhD, Jesse D" userId="e17e4af4-92ba-4f4f-89d8-f6d4f5501821" providerId="ADAL" clId="{AF750AC1-FCBC-C64B-9154-23FC45454528}" dt="2020-04-15T23:05:56.292" v="14"/>
+            <ac:spMkLst>
+              <pc:docMk/>
+              <pc:sldMasterMk cId="2769565298" sldId="2147483684"/>
+              <pc:sldLayoutMk cId="3686889034" sldId="2147483693"/>
+              <ac:spMk id="3" creationId="{00000000-0000-0000-0000-000000000000}"/>
+            </ac:spMkLst>
+          </pc:spChg>
+          <pc:spChg chg="mod">
+            <ac:chgData name="Bloom PhD, Jesse D" userId="e17e4af4-92ba-4f4f-89d8-f6d4f5501821" providerId="ADAL" clId="{AF750AC1-FCBC-C64B-9154-23FC45454528}" dt="2020-04-15T23:05:56.292" v="14"/>
+            <ac:spMkLst>
+              <pc:docMk/>
+              <pc:sldMasterMk cId="2769565298" sldId="2147483684"/>
+              <pc:sldLayoutMk cId="3686889034" sldId="2147483693"/>
+              <ac:spMk id="4" creationId="{00000000-0000-0000-0000-000000000000}"/>
+            </ac:spMkLst>
+          </pc:spChg>
+        </pc:sldLayoutChg>
+        <pc:sldLayoutChg chg="modSp">
+          <pc:chgData name="Bloom PhD, Jesse D" userId="e17e4af4-92ba-4f4f-89d8-f6d4f5501821" providerId="ADAL" clId="{AF750AC1-FCBC-C64B-9154-23FC45454528}" dt="2020-04-15T23:05:56.292" v="14"/>
+          <pc:sldLayoutMkLst>
+            <pc:docMk/>
+            <pc:sldMasterMk cId="2769565298" sldId="2147483684"/>
+            <pc:sldLayoutMk cId="3541191645" sldId="2147483695"/>
+          </pc:sldLayoutMkLst>
+          <pc:spChg chg="mod">
+            <ac:chgData name="Bloom PhD, Jesse D" userId="e17e4af4-92ba-4f4f-89d8-f6d4f5501821" providerId="ADAL" clId="{AF750AC1-FCBC-C64B-9154-23FC45454528}" dt="2020-04-15T23:05:56.292" v="14"/>
+            <ac:spMkLst>
+              <pc:docMk/>
+              <pc:sldMasterMk cId="2769565298" sldId="2147483684"/>
+              <pc:sldLayoutMk cId="3541191645" sldId="2147483695"/>
+              <ac:spMk id="2" creationId="{00000000-0000-0000-0000-000000000000}"/>
+            </ac:spMkLst>
+          </pc:spChg>
+          <pc:spChg chg="mod">
+            <ac:chgData name="Bloom PhD, Jesse D" userId="e17e4af4-92ba-4f4f-89d8-f6d4f5501821" providerId="ADAL" clId="{AF750AC1-FCBC-C64B-9154-23FC45454528}" dt="2020-04-15T23:05:56.292" v="14"/>
+            <ac:spMkLst>
+              <pc:docMk/>
+              <pc:sldMasterMk cId="2769565298" sldId="2147483684"/>
+              <pc:sldLayoutMk cId="3541191645" sldId="2147483695"/>
+              <ac:spMk id="3" creationId="{00000000-0000-0000-0000-000000000000}"/>
+            </ac:spMkLst>
+          </pc:spChg>
+        </pc:sldLayoutChg>
+      </pc:sldMasterChg>
+    </pc:docChg>
+  </pc:docChgLst>
+</pc:chgInfo>
 </file>
 
 <file path=ppt/slideLayouts/slideLayout1.xml><?xml version="1.0" encoding="utf-8"?>
@@ -144,15 +1023,15 @@
         </p:nvSpPr>
         <p:spPr>
           <a:xfrm>
-            <a:off x="1371600" y="763311"/>
-            <a:ext cx="8229600" cy="1623789"/>
+            <a:off x="822960" y="1227065"/>
+            <a:ext cx="9326880" cy="2610332"/>
           </a:xfrm>
         </p:spPr>
         <p:txBody>
           <a:bodyPr anchor="b"/>
           <a:lstStyle>
             <a:lvl1pPr algn="ctr">
-              <a:defRPr sz="4081"/>
+              <a:defRPr sz="6560"/>
             </a:lvl1pPr>
           </a:lstStyle>
           <a:p>
@@ -176,8 +1055,8 @@
         </p:nvSpPr>
         <p:spPr>
           <a:xfrm>
-            <a:off x="1371600" y="2449720"/>
-            <a:ext cx="8229600" cy="1126071"/>
+            <a:off x="1371600" y="3938062"/>
+            <a:ext cx="8229600" cy="1810223"/>
           </a:xfrm>
         </p:spPr>
         <p:txBody>
@@ -185,39 +1064,39 @@
           <a:lstStyle>
             <a:lvl1pPr marL="0" indent="0" algn="ctr">
               <a:buNone/>
-              <a:defRPr sz="1632"/>
+              <a:defRPr sz="2624"/>
             </a:lvl1pPr>
-            <a:lvl2pPr marL="310942" indent="0" algn="ctr">
-              <a:buNone/>
-              <a:defRPr sz="1360"/>
+            <a:lvl2pPr marL="499857" indent="0" algn="ctr">
+              <a:buNone/>
+              <a:defRPr sz="2187"/>
             </a:lvl2pPr>
-            <a:lvl3pPr marL="621883" indent="0" algn="ctr">
-              <a:buNone/>
-              <a:defRPr sz="1224"/>
+            <a:lvl3pPr marL="999714" indent="0" algn="ctr">
+              <a:buNone/>
+              <a:defRPr sz="1968"/>
             </a:lvl3pPr>
-            <a:lvl4pPr marL="932825" indent="0" algn="ctr">
-              <a:buNone/>
-              <a:defRPr sz="1088"/>
+            <a:lvl4pPr marL="1499570" indent="0" algn="ctr">
+              <a:buNone/>
+              <a:defRPr sz="1749"/>
             </a:lvl4pPr>
-            <a:lvl5pPr marL="1243767" indent="0" algn="ctr">
-              <a:buNone/>
-              <a:defRPr sz="1088"/>
+            <a:lvl5pPr marL="1999427" indent="0" algn="ctr">
+              <a:buNone/>
+              <a:defRPr sz="1749"/>
             </a:lvl5pPr>
-            <a:lvl6pPr marL="1554709" indent="0" algn="ctr">
-              <a:buNone/>
-              <a:defRPr sz="1088"/>
+            <a:lvl6pPr marL="2499284" indent="0" algn="ctr">
+              <a:buNone/>
+              <a:defRPr sz="1749"/>
             </a:lvl6pPr>
-            <a:lvl7pPr marL="1865650" indent="0" algn="ctr">
-              <a:buNone/>
-              <a:defRPr sz="1088"/>
+            <a:lvl7pPr marL="2999141" indent="0" algn="ctr">
+              <a:buNone/>
+              <a:defRPr sz="1749"/>
             </a:lvl7pPr>
-            <a:lvl8pPr marL="2176592" indent="0" algn="ctr">
-              <a:buNone/>
-              <a:defRPr sz="1088"/>
+            <a:lvl8pPr marL="3498997" indent="0" algn="ctr">
+              <a:buNone/>
+              <a:defRPr sz="1749"/>
             </a:lvl8pPr>
-            <a:lvl9pPr marL="2487534" indent="0" algn="ctr">
-              <a:buNone/>
-              <a:defRPr sz="1088"/>
+            <a:lvl9pPr marL="3998854" indent="0" algn="ctr">
+              <a:buNone/>
+              <a:defRPr sz="1749"/>
             </a:lvl9pPr>
           </a:lstStyle>
           <a:p>
@@ -246,7 +1125,7 @@
           <a:p>
             <a:fld id="{CF2D9C2E-299D-8F4E-B839-6838C3236DDB}" type="datetimeFigureOut">
               <a:rPr lang="en-US" smtClean="0"/>
-              <a:t>4/14/20</a:t>
+              <a:t>4/15/20</a:t>
             </a:fld>
             <a:endParaRPr lang="en-US"/>
           </a:p>
@@ -297,7 +1176,7 @@
     </p:spTree>
     <p:extLst>
       <p:ext uri="{BB962C8B-B14F-4D97-AF65-F5344CB8AC3E}">
-        <p14:creationId xmlns:p14="http://schemas.microsoft.com/office/powerpoint/2010/main" val="2128635893"/>
+        <p14:creationId xmlns:p14="http://schemas.microsoft.com/office/powerpoint/2010/main" val="2042679556"/>
       </p:ext>
     </p:extLst>
   </p:cSld>
@@ -416,7 +1295,7 @@
           <a:p>
             <a:fld id="{CF2D9C2E-299D-8F4E-B839-6838C3236DDB}" type="datetimeFigureOut">
               <a:rPr lang="en-US" smtClean="0"/>
-              <a:t>4/14/20</a:t>
+              <a:t>4/15/20</a:t>
             </a:fld>
             <a:endParaRPr lang="en-US"/>
           </a:p>
@@ -467,7 +1346,7 @@
     </p:spTree>
     <p:extLst>
       <p:ext uri="{BB962C8B-B14F-4D97-AF65-F5344CB8AC3E}">
-        <p14:creationId xmlns:p14="http://schemas.microsoft.com/office/powerpoint/2010/main" val="840820900"/>
+        <p14:creationId xmlns:p14="http://schemas.microsoft.com/office/powerpoint/2010/main" val="4272184333"/>
       </p:ext>
     </p:extLst>
   </p:cSld>
@@ -506,8 +1385,8 @@
         </p:nvSpPr>
         <p:spPr>
           <a:xfrm>
-            <a:off x="7852410" y="248319"/>
-            <a:ext cx="2366010" cy="3952588"/>
+            <a:off x="7852411" y="399186"/>
+            <a:ext cx="2366010" cy="6354008"/>
           </a:xfrm>
         </p:spPr>
         <p:txBody>
@@ -534,8 +1413,8 @@
         </p:nvSpPr>
         <p:spPr>
           <a:xfrm>
-            <a:off x="754380" y="248319"/>
-            <a:ext cx="6960870" cy="3952588"/>
+            <a:off x="754381" y="399186"/>
+            <a:ext cx="6960870" cy="6354008"/>
           </a:xfrm>
         </p:spPr>
         <p:txBody>
@@ -596,7 +1475,7 @@
           <a:p>
             <a:fld id="{CF2D9C2E-299D-8F4E-B839-6838C3236DDB}" type="datetimeFigureOut">
               <a:rPr lang="en-US" smtClean="0"/>
-              <a:t>4/14/20</a:t>
+              <a:t>4/15/20</a:t>
             </a:fld>
             <a:endParaRPr lang="en-US"/>
           </a:p>
@@ -647,7 +1526,7 @@
     </p:spTree>
     <p:extLst>
       <p:ext uri="{BB962C8B-B14F-4D97-AF65-F5344CB8AC3E}">
-        <p14:creationId xmlns:p14="http://schemas.microsoft.com/office/powerpoint/2010/main" val="1575578545"/>
+        <p14:creationId xmlns:p14="http://schemas.microsoft.com/office/powerpoint/2010/main" val="608865925"/>
       </p:ext>
     </p:extLst>
   </p:cSld>
@@ -766,7 +1645,7 @@
           <a:p>
             <a:fld id="{CF2D9C2E-299D-8F4E-B839-6838C3236DDB}" type="datetimeFigureOut">
               <a:rPr lang="en-US" smtClean="0"/>
-              <a:t>4/14/20</a:t>
+              <a:t>4/15/20</a:t>
             </a:fld>
             <a:endParaRPr lang="en-US"/>
           </a:p>
@@ -817,7 +1696,7 @@
     </p:spTree>
     <p:extLst>
       <p:ext uri="{BB962C8B-B14F-4D97-AF65-F5344CB8AC3E}">
-        <p14:creationId xmlns:p14="http://schemas.microsoft.com/office/powerpoint/2010/main" val="451525688"/>
+        <p14:creationId xmlns:p14="http://schemas.microsoft.com/office/powerpoint/2010/main" val="1422889286"/>
       </p:ext>
     </p:extLst>
   </p:cSld>
@@ -856,15 +1735,15 @@
         </p:nvSpPr>
         <p:spPr>
           <a:xfrm>
-            <a:off x="748665" y="1162781"/>
-            <a:ext cx="9464040" cy="1940125"/>
+            <a:off x="748666" y="1869236"/>
+            <a:ext cx="9464040" cy="3118861"/>
           </a:xfrm>
         </p:spPr>
         <p:txBody>
           <a:bodyPr anchor="b"/>
           <a:lstStyle>
             <a:lvl1pPr>
-              <a:defRPr sz="4081"/>
+              <a:defRPr sz="6560"/>
             </a:lvl1pPr>
           </a:lstStyle>
           <a:p>
@@ -888,8 +1767,8 @@
         </p:nvSpPr>
         <p:spPr>
           <a:xfrm>
-            <a:off x="748665" y="3121260"/>
-            <a:ext cx="9464040" cy="1020266"/>
+            <a:off x="748666" y="5017602"/>
+            <a:ext cx="9464040" cy="1640135"/>
           </a:xfrm>
         </p:spPr>
         <p:txBody>
@@ -897,17 +1776,15 @@
           <a:lstStyle>
             <a:lvl1pPr marL="0" indent="0">
               <a:buNone/>
-              <a:defRPr sz="1632">
+              <a:defRPr sz="2624">
                 <a:solidFill>
-                  <a:schemeClr val="tx1">
-                    <a:tint val="75000"/>
-                  </a:schemeClr>
+                  <a:schemeClr val="tx1"/>
                 </a:solidFill>
               </a:defRPr>
             </a:lvl1pPr>
-            <a:lvl2pPr marL="310942" indent="0">
-              <a:buNone/>
-              <a:defRPr sz="1360">
+            <a:lvl2pPr marL="499857" indent="0">
+              <a:buNone/>
+              <a:defRPr sz="2187">
                 <a:solidFill>
                   <a:schemeClr val="tx1">
                     <a:tint val="75000"/>
@@ -915,9 +1792,9 @@
                 </a:solidFill>
               </a:defRPr>
             </a:lvl2pPr>
-            <a:lvl3pPr marL="621883" indent="0">
-              <a:buNone/>
-              <a:defRPr sz="1224">
+            <a:lvl3pPr marL="999714" indent="0">
+              <a:buNone/>
+              <a:defRPr sz="1968">
                 <a:solidFill>
                   <a:schemeClr val="tx1">
                     <a:tint val="75000"/>
@@ -925,9 +1802,9 @@
                 </a:solidFill>
               </a:defRPr>
             </a:lvl3pPr>
-            <a:lvl4pPr marL="932825" indent="0">
-              <a:buNone/>
-              <a:defRPr sz="1088">
+            <a:lvl4pPr marL="1499570" indent="0">
+              <a:buNone/>
+              <a:defRPr sz="1749">
                 <a:solidFill>
                   <a:schemeClr val="tx1">
                     <a:tint val="75000"/>
@@ -935,9 +1812,9 @@
                 </a:solidFill>
               </a:defRPr>
             </a:lvl4pPr>
-            <a:lvl5pPr marL="1243767" indent="0">
-              <a:buNone/>
-              <a:defRPr sz="1088">
+            <a:lvl5pPr marL="1999427" indent="0">
+              <a:buNone/>
+              <a:defRPr sz="1749">
                 <a:solidFill>
                   <a:schemeClr val="tx1">
                     <a:tint val="75000"/>
@@ -945,9 +1822,9 @@
                 </a:solidFill>
               </a:defRPr>
             </a:lvl5pPr>
-            <a:lvl6pPr marL="1554709" indent="0">
-              <a:buNone/>
-              <a:defRPr sz="1088">
+            <a:lvl6pPr marL="2499284" indent="0">
+              <a:buNone/>
+              <a:defRPr sz="1749">
                 <a:solidFill>
                   <a:schemeClr val="tx1">
                     <a:tint val="75000"/>
@@ -955,9 +1832,9 @@
                 </a:solidFill>
               </a:defRPr>
             </a:lvl6pPr>
-            <a:lvl7pPr marL="1865650" indent="0">
-              <a:buNone/>
-              <a:defRPr sz="1088">
+            <a:lvl7pPr marL="2999141" indent="0">
+              <a:buNone/>
+              <a:defRPr sz="1749">
                 <a:solidFill>
                   <a:schemeClr val="tx1">
                     <a:tint val="75000"/>
@@ -965,9 +1842,9 @@
                 </a:solidFill>
               </a:defRPr>
             </a:lvl7pPr>
-            <a:lvl8pPr marL="2176592" indent="0">
-              <a:buNone/>
-              <a:defRPr sz="1088">
+            <a:lvl8pPr marL="3498997" indent="0">
+              <a:buNone/>
+              <a:defRPr sz="1749">
                 <a:solidFill>
                   <a:schemeClr val="tx1">
                     <a:tint val="75000"/>
@@ -975,9 +1852,9 @@
                 </a:solidFill>
               </a:defRPr>
             </a:lvl8pPr>
-            <a:lvl9pPr marL="2487534" indent="0">
-              <a:buNone/>
-              <a:defRPr sz="1088">
+            <a:lvl9pPr marL="3998854" indent="0">
+              <a:buNone/>
+              <a:defRPr sz="1749">
                 <a:solidFill>
                   <a:schemeClr val="tx1">
                     <a:tint val="75000"/>
@@ -1012,7 +1889,7 @@
           <a:p>
             <a:fld id="{CF2D9C2E-299D-8F4E-B839-6838C3236DDB}" type="datetimeFigureOut">
               <a:rPr lang="en-US" smtClean="0"/>
-              <a:t>4/14/20</a:t>
+              <a:t>4/15/20</a:t>
             </a:fld>
             <a:endParaRPr lang="en-US"/>
           </a:p>
@@ -1063,7 +1940,7 @@
     </p:spTree>
     <p:extLst>
       <p:ext uri="{BB962C8B-B14F-4D97-AF65-F5344CB8AC3E}">
-        <p14:creationId xmlns:p14="http://schemas.microsoft.com/office/powerpoint/2010/main" val="4203870080"/>
+        <p14:creationId xmlns:p14="http://schemas.microsoft.com/office/powerpoint/2010/main" val="1999044015"/>
       </p:ext>
     </p:extLst>
   </p:cSld>
@@ -1125,8 +2002,8 @@
         </p:nvSpPr>
         <p:spPr>
           <a:xfrm>
-            <a:off x="754380" y="1241594"/>
-            <a:ext cx="4663440" cy="2959313"/>
+            <a:off x="754380" y="1995932"/>
+            <a:ext cx="4663440" cy="4757262"/>
           </a:xfrm>
         </p:spPr>
         <p:txBody>
@@ -1182,8 +2059,8 @@
         </p:nvSpPr>
         <p:spPr>
           <a:xfrm>
-            <a:off x="5554980" y="1241594"/>
-            <a:ext cx="4663440" cy="2959313"/>
+            <a:off x="5554980" y="1995932"/>
+            <a:ext cx="4663440" cy="4757262"/>
           </a:xfrm>
         </p:spPr>
         <p:txBody>
@@ -1244,7 +2121,7 @@
           <a:p>
             <a:fld id="{CF2D9C2E-299D-8F4E-B839-6838C3236DDB}" type="datetimeFigureOut">
               <a:rPr lang="en-US" smtClean="0"/>
-              <a:t>4/14/20</a:t>
+              <a:t>4/15/20</a:t>
             </a:fld>
             <a:endParaRPr lang="en-US"/>
           </a:p>
@@ -1295,7 +2172,7 @@
     </p:spTree>
     <p:extLst>
       <p:ext uri="{BB962C8B-B14F-4D97-AF65-F5344CB8AC3E}">
-        <p14:creationId xmlns:p14="http://schemas.microsoft.com/office/powerpoint/2010/main" val="2952863145"/>
+        <p14:creationId xmlns:p14="http://schemas.microsoft.com/office/powerpoint/2010/main" val="789554105"/>
       </p:ext>
     </p:extLst>
   </p:cSld>
@@ -1334,8 +2211,8 @@
         </p:nvSpPr>
         <p:spPr>
           <a:xfrm>
-            <a:off x="755809" y="248319"/>
-            <a:ext cx="9464040" cy="901506"/>
+            <a:off x="755809" y="399188"/>
+            <a:ext cx="9464040" cy="1449221"/>
           </a:xfrm>
         </p:spPr>
         <p:txBody>
@@ -1362,8 +2239,8 @@
         </p:nvSpPr>
         <p:spPr>
           <a:xfrm>
-            <a:off x="755810" y="1143347"/>
-            <a:ext cx="4642008" cy="560336"/>
+            <a:off x="755810" y="1837994"/>
+            <a:ext cx="4642008" cy="900772"/>
           </a:xfrm>
         </p:spPr>
         <p:txBody>
@@ -1371,39 +2248,39 @@
           <a:lstStyle>
             <a:lvl1pPr marL="0" indent="0">
               <a:buNone/>
-              <a:defRPr sz="1632" b="1"/>
+              <a:defRPr sz="2624" b="1"/>
             </a:lvl1pPr>
-            <a:lvl2pPr marL="310942" indent="0">
-              <a:buNone/>
-              <a:defRPr sz="1360" b="1"/>
+            <a:lvl2pPr marL="499857" indent="0">
+              <a:buNone/>
+              <a:defRPr sz="2187" b="1"/>
             </a:lvl2pPr>
-            <a:lvl3pPr marL="621883" indent="0">
-              <a:buNone/>
-              <a:defRPr sz="1224" b="1"/>
+            <a:lvl3pPr marL="999714" indent="0">
+              <a:buNone/>
+              <a:defRPr sz="1968" b="1"/>
             </a:lvl3pPr>
-            <a:lvl4pPr marL="932825" indent="0">
-              <a:buNone/>
-              <a:defRPr sz="1088" b="1"/>
+            <a:lvl4pPr marL="1499570" indent="0">
+              <a:buNone/>
+              <a:defRPr sz="1749" b="1"/>
             </a:lvl4pPr>
-            <a:lvl5pPr marL="1243767" indent="0">
-              <a:buNone/>
-              <a:defRPr sz="1088" b="1"/>
+            <a:lvl5pPr marL="1999427" indent="0">
+              <a:buNone/>
+              <a:defRPr sz="1749" b="1"/>
             </a:lvl5pPr>
-            <a:lvl6pPr marL="1554709" indent="0">
-              <a:buNone/>
-              <a:defRPr sz="1088" b="1"/>
+            <a:lvl6pPr marL="2499284" indent="0">
+              <a:buNone/>
+              <a:defRPr sz="1749" b="1"/>
             </a:lvl6pPr>
-            <a:lvl7pPr marL="1865650" indent="0">
-              <a:buNone/>
-              <a:defRPr sz="1088" b="1"/>
+            <a:lvl7pPr marL="2999141" indent="0">
+              <a:buNone/>
+              <a:defRPr sz="1749" b="1"/>
             </a:lvl7pPr>
-            <a:lvl8pPr marL="2176592" indent="0">
-              <a:buNone/>
-              <a:defRPr sz="1088" b="1"/>
+            <a:lvl8pPr marL="3498997" indent="0">
+              <a:buNone/>
+              <a:defRPr sz="1749" b="1"/>
             </a:lvl8pPr>
-            <a:lvl9pPr marL="2487534" indent="0">
-              <a:buNone/>
-              <a:defRPr sz="1088" b="1"/>
+            <a:lvl9pPr marL="3998854" indent="0">
+              <a:buNone/>
+              <a:defRPr sz="1749" b="1"/>
             </a:lvl9pPr>
           </a:lstStyle>
           <a:p>
@@ -1427,8 +2304,8 @@
         </p:nvSpPr>
         <p:spPr>
           <a:xfrm>
-            <a:off x="755810" y="1703683"/>
-            <a:ext cx="4642008" cy="2505861"/>
+            <a:off x="755810" y="2738766"/>
+            <a:ext cx="4642008" cy="4028313"/>
           </a:xfrm>
         </p:spPr>
         <p:txBody>
@@ -1484,8 +2361,8 @@
         </p:nvSpPr>
         <p:spPr>
           <a:xfrm>
-            <a:off x="5554980" y="1143347"/>
-            <a:ext cx="4664869" cy="560336"/>
+            <a:off x="5554981" y="1837994"/>
+            <a:ext cx="4664869" cy="900772"/>
           </a:xfrm>
         </p:spPr>
         <p:txBody>
@@ -1493,39 +2370,39 @@
           <a:lstStyle>
             <a:lvl1pPr marL="0" indent="0">
               <a:buNone/>
-              <a:defRPr sz="1632" b="1"/>
+              <a:defRPr sz="2624" b="1"/>
             </a:lvl1pPr>
-            <a:lvl2pPr marL="310942" indent="0">
-              <a:buNone/>
-              <a:defRPr sz="1360" b="1"/>
+            <a:lvl2pPr marL="499857" indent="0">
+              <a:buNone/>
+              <a:defRPr sz="2187" b="1"/>
             </a:lvl2pPr>
-            <a:lvl3pPr marL="621883" indent="0">
-              <a:buNone/>
-              <a:defRPr sz="1224" b="1"/>
+            <a:lvl3pPr marL="999714" indent="0">
+              <a:buNone/>
+              <a:defRPr sz="1968" b="1"/>
             </a:lvl3pPr>
-            <a:lvl4pPr marL="932825" indent="0">
-              <a:buNone/>
-              <a:defRPr sz="1088" b="1"/>
+            <a:lvl4pPr marL="1499570" indent="0">
+              <a:buNone/>
+              <a:defRPr sz="1749" b="1"/>
             </a:lvl4pPr>
-            <a:lvl5pPr marL="1243767" indent="0">
-              <a:buNone/>
-              <a:defRPr sz="1088" b="1"/>
+            <a:lvl5pPr marL="1999427" indent="0">
+              <a:buNone/>
+              <a:defRPr sz="1749" b="1"/>
             </a:lvl5pPr>
-            <a:lvl6pPr marL="1554709" indent="0">
-              <a:buNone/>
-              <a:defRPr sz="1088" b="1"/>
+            <a:lvl6pPr marL="2499284" indent="0">
+              <a:buNone/>
+              <a:defRPr sz="1749" b="1"/>
             </a:lvl6pPr>
-            <a:lvl7pPr marL="1865650" indent="0">
-              <a:buNone/>
-              <a:defRPr sz="1088" b="1"/>
+            <a:lvl7pPr marL="2999141" indent="0">
+              <a:buNone/>
+              <a:defRPr sz="1749" b="1"/>
             </a:lvl7pPr>
-            <a:lvl8pPr marL="2176592" indent="0">
-              <a:buNone/>
-              <a:defRPr sz="1088" b="1"/>
+            <a:lvl8pPr marL="3498997" indent="0">
+              <a:buNone/>
+              <a:defRPr sz="1749" b="1"/>
             </a:lvl8pPr>
-            <a:lvl9pPr marL="2487534" indent="0">
-              <a:buNone/>
-              <a:defRPr sz="1088" b="1"/>
+            <a:lvl9pPr marL="3998854" indent="0">
+              <a:buNone/>
+              <a:defRPr sz="1749" b="1"/>
             </a:lvl9pPr>
           </a:lstStyle>
           <a:p>
@@ -1549,8 +2426,8 @@
         </p:nvSpPr>
         <p:spPr>
           <a:xfrm>
-            <a:off x="5554980" y="1703683"/>
-            <a:ext cx="4664869" cy="2505861"/>
+            <a:off x="5554981" y="2738766"/>
+            <a:ext cx="4664869" cy="4028313"/>
           </a:xfrm>
         </p:spPr>
         <p:txBody>
@@ -1611,7 +2488,7 @@
           <a:p>
             <a:fld id="{CF2D9C2E-299D-8F4E-B839-6838C3236DDB}" type="datetimeFigureOut">
               <a:rPr lang="en-US" smtClean="0"/>
-              <a:t>4/14/20</a:t>
+              <a:t>4/15/20</a:t>
             </a:fld>
             <a:endParaRPr lang="en-US"/>
           </a:p>
@@ -1662,7 +2539,7 @@
     </p:spTree>
     <p:extLst>
       <p:ext uri="{BB962C8B-B14F-4D97-AF65-F5344CB8AC3E}">
-        <p14:creationId xmlns:p14="http://schemas.microsoft.com/office/powerpoint/2010/main" val="948441193"/>
+        <p14:creationId xmlns:p14="http://schemas.microsoft.com/office/powerpoint/2010/main" val="789926523"/>
       </p:ext>
     </p:extLst>
   </p:cSld>
@@ -1729,7 +2606,7 @@
           <a:p>
             <a:fld id="{CF2D9C2E-299D-8F4E-B839-6838C3236DDB}" type="datetimeFigureOut">
               <a:rPr lang="en-US" smtClean="0"/>
-              <a:t>4/14/20</a:t>
+              <a:t>4/15/20</a:t>
             </a:fld>
             <a:endParaRPr lang="en-US"/>
           </a:p>
@@ -1780,7 +2657,7 @@
     </p:spTree>
     <p:extLst>
       <p:ext uri="{BB962C8B-B14F-4D97-AF65-F5344CB8AC3E}">
-        <p14:creationId xmlns:p14="http://schemas.microsoft.com/office/powerpoint/2010/main" val="2522458264"/>
+        <p14:creationId xmlns:p14="http://schemas.microsoft.com/office/powerpoint/2010/main" val="2843054499"/>
       </p:ext>
     </p:extLst>
   </p:cSld>
@@ -1824,7 +2701,7 @@
           <a:p>
             <a:fld id="{CF2D9C2E-299D-8F4E-B839-6838C3236DDB}" type="datetimeFigureOut">
               <a:rPr lang="en-US" smtClean="0"/>
-              <a:t>4/14/20</a:t>
+              <a:t>4/15/20</a:t>
             </a:fld>
             <a:endParaRPr lang="en-US"/>
           </a:p>
@@ -1875,7 +2752,7 @@
     </p:spTree>
     <p:extLst>
       <p:ext uri="{BB962C8B-B14F-4D97-AF65-F5344CB8AC3E}">
-        <p14:creationId xmlns:p14="http://schemas.microsoft.com/office/powerpoint/2010/main" val="3667457376"/>
+        <p14:creationId xmlns:p14="http://schemas.microsoft.com/office/powerpoint/2010/main" val="1626508538"/>
       </p:ext>
     </p:extLst>
   </p:cSld>
@@ -1914,15 +2791,15 @@
         </p:nvSpPr>
         <p:spPr>
           <a:xfrm>
-            <a:off x="755810" y="310938"/>
-            <a:ext cx="3539013" cy="1088284"/>
+            <a:off x="755809" y="499851"/>
+            <a:ext cx="3539014" cy="1749478"/>
           </a:xfrm>
         </p:spPr>
         <p:txBody>
           <a:bodyPr anchor="b"/>
           <a:lstStyle>
             <a:lvl1pPr>
-              <a:defRPr sz="2176"/>
+              <a:defRPr sz="3499"/>
             </a:lvl1pPr>
           </a:lstStyle>
           <a:p>
@@ -1946,39 +2823,39 @@
         </p:nvSpPr>
         <p:spPr>
           <a:xfrm>
-            <a:off x="4664869" y="671541"/>
-            <a:ext cx="5554980" cy="3314516"/>
+            <a:off x="4664869" y="1079541"/>
+            <a:ext cx="5554980" cy="5328271"/>
           </a:xfrm>
         </p:spPr>
         <p:txBody>
           <a:bodyPr/>
           <a:lstStyle>
             <a:lvl1pPr>
-              <a:defRPr sz="2176"/>
+              <a:defRPr sz="3499"/>
             </a:lvl1pPr>
             <a:lvl2pPr>
-              <a:defRPr sz="1904"/>
+              <a:defRPr sz="3061"/>
             </a:lvl2pPr>
             <a:lvl3pPr>
-              <a:defRPr sz="1632"/>
+              <a:defRPr sz="2624"/>
             </a:lvl3pPr>
             <a:lvl4pPr>
-              <a:defRPr sz="1360"/>
+              <a:defRPr sz="2187"/>
             </a:lvl4pPr>
             <a:lvl5pPr>
-              <a:defRPr sz="1360"/>
+              <a:defRPr sz="2187"/>
             </a:lvl5pPr>
             <a:lvl6pPr>
-              <a:defRPr sz="1360"/>
+              <a:defRPr sz="2187"/>
             </a:lvl6pPr>
             <a:lvl7pPr>
-              <a:defRPr sz="1360"/>
+              <a:defRPr sz="2187"/>
             </a:lvl7pPr>
             <a:lvl8pPr>
-              <a:defRPr sz="1360"/>
+              <a:defRPr sz="2187"/>
             </a:lvl8pPr>
             <a:lvl9pPr>
-              <a:defRPr sz="1360"/>
+              <a:defRPr sz="2187"/>
             </a:lvl9pPr>
           </a:lstStyle>
           <a:p>
@@ -2031,8 +2908,8 @@
         </p:nvSpPr>
         <p:spPr>
           <a:xfrm>
-            <a:off x="755810" y="1399222"/>
-            <a:ext cx="3539013" cy="2592233"/>
+            <a:off x="755809" y="2249329"/>
+            <a:ext cx="3539014" cy="4167160"/>
           </a:xfrm>
         </p:spPr>
         <p:txBody>
@@ -2040,39 +2917,39 @@
           <a:lstStyle>
             <a:lvl1pPr marL="0" indent="0">
               <a:buNone/>
-              <a:defRPr sz="1088"/>
+              <a:defRPr sz="1749"/>
             </a:lvl1pPr>
-            <a:lvl2pPr marL="310942" indent="0">
-              <a:buNone/>
-              <a:defRPr sz="952"/>
+            <a:lvl2pPr marL="499857" indent="0">
+              <a:buNone/>
+              <a:defRPr sz="1531"/>
             </a:lvl2pPr>
-            <a:lvl3pPr marL="621883" indent="0">
-              <a:buNone/>
-              <a:defRPr sz="816"/>
+            <a:lvl3pPr marL="999714" indent="0">
+              <a:buNone/>
+              <a:defRPr sz="1312"/>
             </a:lvl3pPr>
-            <a:lvl4pPr marL="932825" indent="0">
-              <a:buNone/>
-              <a:defRPr sz="680"/>
+            <a:lvl4pPr marL="1499570" indent="0">
+              <a:buNone/>
+              <a:defRPr sz="1093"/>
             </a:lvl4pPr>
-            <a:lvl5pPr marL="1243767" indent="0">
-              <a:buNone/>
-              <a:defRPr sz="680"/>
+            <a:lvl5pPr marL="1999427" indent="0">
+              <a:buNone/>
+              <a:defRPr sz="1093"/>
             </a:lvl5pPr>
-            <a:lvl6pPr marL="1554709" indent="0">
-              <a:buNone/>
-              <a:defRPr sz="680"/>
+            <a:lvl6pPr marL="2499284" indent="0">
+              <a:buNone/>
+              <a:defRPr sz="1093"/>
             </a:lvl6pPr>
-            <a:lvl7pPr marL="1865650" indent="0">
-              <a:buNone/>
-              <a:defRPr sz="680"/>
+            <a:lvl7pPr marL="2999141" indent="0">
+              <a:buNone/>
+              <a:defRPr sz="1093"/>
             </a:lvl7pPr>
-            <a:lvl8pPr marL="2176592" indent="0">
-              <a:buNone/>
-              <a:defRPr sz="680"/>
+            <a:lvl8pPr marL="3498997" indent="0">
+              <a:buNone/>
+              <a:defRPr sz="1093"/>
             </a:lvl8pPr>
-            <a:lvl9pPr marL="2487534" indent="0">
-              <a:buNone/>
-              <a:defRPr sz="680"/>
+            <a:lvl9pPr marL="3998854" indent="0">
+              <a:buNone/>
+              <a:defRPr sz="1093"/>
             </a:lvl9pPr>
           </a:lstStyle>
           <a:p>
@@ -2101,7 +2978,7 @@
           <a:p>
             <a:fld id="{CF2D9C2E-299D-8F4E-B839-6838C3236DDB}" type="datetimeFigureOut">
               <a:rPr lang="en-US" smtClean="0"/>
-              <a:t>4/14/20</a:t>
+              <a:t>4/15/20</a:t>
             </a:fld>
             <a:endParaRPr lang="en-US"/>
           </a:p>
@@ -2152,7 +3029,7 @@
     </p:spTree>
     <p:extLst>
       <p:ext uri="{BB962C8B-B14F-4D97-AF65-F5344CB8AC3E}">
-        <p14:creationId xmlns:p14="http://schemas.microsoft.com/office/powerpoint/2010/main" val="2321398093"/>
+        <p14:creationId xmlns:p14="http://schemas.microsoft.com/office/powerpoint/2010/main" val="3597293012"/>
       </p:ext>
     </p:extLst>
   </p:cSld>
@@ -2191,15 +3068,15 @@
         </p:nvSpPr>
         <p:spPr>
           <a:xfrm>
-            <a:off x="755810" y="310938"/>
-            <a:ext cx="3539013" cy="1088284"/>
+            <a:off x="755809" y="499851"/>
+            <a:ext cx="3539014" cy="1749478"/>
           </a:xfrm>
         </p:spPr>
         <p:txBody>
           <a:bodyPr anchor="b"/>
           <a:lstStyle>
             <a:lvl1pPr>
-              <a:defRPr sz="2176"/>
+              <a:defRPr sz="3499"/>
             </a:lvl1pPr>
           </a:lstStyle>
           <a:p>
@@ -2223,8 +3100,8 @@
         </p:nvSpPr>
         <p:spPr>
           <a:xfrm>
-            <a:off x="4664869" y="671541"/>
-            <a:ext cx="5554980" cy="3314516"/>
+            <a:off x="4664869" y="1079541"/>
+            <a:ext cx="5554980" cy="5328271"/>
           </a:xfrm>
         </p:spPr>
         <p:txBody>
@@ -2232,39 +3109,39 @@
           <a:lstStyle>
             <a:lvl1pPr marL="0" indent="0">
               <a:buNone/>
-              <a:defRPr sz="2176"/>
+              <a:defRPr sz="3499"/>
             </a:lvl1pPr>
-            <a:lvl2pPr marL="310942" indent="0">
-              <a:buNone/>
-              <a:defRPr sz="1904"/>
+            <a:lvl2pPr marL="499857" indent="0">
+              <a:buNone/>
+              <a:defRPr sz="3061"/>
             </a:lvl2pPr>
-            <a:lvl3pPr marL="621883" indent="0">
-              <a:buNone/>
-              <a:defRPr sz="1632"/>
+            <a:lvl3pPr marL="999714" indent="0">
+              <a:buNone/>
+              <a:defRPr sz="2624"/>
             </a:lvl3pPr>
-            <a:lvl4pPr marL="932825" indent="0">
-              <a:buNone/>
-              <a:defRPr sz="1360"/>
+            <a:lvl4pPr marL="1499570" indent="0">
+              <a:buNone/>
+              <a:defRPr sz="2187"/>
             </a:lvl4pPr>
-            <a:lvl5pPr marL="1243767" indent="0">
-              <a:buNone/>
-              <a:defRPr sz="1360"/>
+            <a:lvl5pPr marL="1999427" indent="0">
+              <a:buNone/>
+              <a:defRPr sz="2187"/>
             </a:lvl5pPr>
-            <a:lvl6pPr marL="1554709" indent="0">
-              <a:buNone/>
-              <a:defRPr sz="1360"/>
+            <a:lvl6pPr marL="2499284" indent="0">
+              <a:buNone/>
+              <a:defRPr sz="2187"/>
             </a:lvl6pPr>
-            <a:lvl7pPr marL="1865650" indent="0">
-              <a:buNone/>
-              <a:defRPr sz="1360"/>
+            <a:lvl7pPr marL="2999141" indent="0">
+              <a:buNone/>
+              <a:defRPr sz="2187"/>
             </a:lvl7pPr>
-            <a:lvl8pPr marL="2176592" indent="0">
-              <a:buNone/>
-              <a:defRPr sz="1360"/>
+            <a:lvl8pPr marL="3498997" indent="0">
+              <a:buNone/>
+              <a:defRPr sz="2187"/>
             </a:lvl8pPr>
-            <a:lvl9pPr marL="2487534" indent="0">
-              <a:buNone/>
-              <a:defRPr sz="1360"/>
+            <a:lvl9pPr marL="3998854" indent="0">
+              <a:buNone/>
+              <a:defRPr sz="2187"/>
             </a:lvl9pPr>
           </a:lstStyle>
           <a:p>
@@ -2288,8 +3165,8 @@
         </p:nvSpPr>
         <p:spPr>
           <a:xfrm>
-            <a:off x="755810" y="1399222"/>
-            <a:ext cx="3539013" cy="2592233"/>
+            <a:off x="755809" y="2249329"/>
+            <a:ext cx="3539014" cy="4167160"/>
           </a:xfrm>
         </p:spPr>
         <p:txBody>
@@ -2297,39 +3174,39 @@
           <a:lstStyle>
             <a:lvl1pPr marL="0" indent="0">
               <a:buNone/>
-              <a:defRPr sz="1088"/>
+              <a:defRPr sz="1749"/>
             </a:lvl1pPr>
-            <a:lvl2pPr marL="310942" indent="0">
-              <a:buNone/>
-              <a:defRPr sz="952"/>
+            <a:lvl2pPr marL="499857" indent="0">
+              <a:buNone/>
+              <a:defRPr sz="1531"/>
             </a:lvl2pPr>
-            <a:lvl3pPr marL="621883" indent="0">
-              <a:buNone/>
-              <a:defRPr sz="816"/>
+            <a:lvl3pPr marL="999714" indent="0">
+              <a:buNone/>
+              <a:defRPr sz="1312"/>
             </a:lvl3pPr>
-            <a:lvl4pPr marL="932825" indent="0">
-              <a:buNone/>
-              <a:defRPr sz="680"/>
+            <a:lvl4pPr marL="1499570" indent="0">
+              <a:buNone/>
+              <a:defRPr sz="1093"/>
             </a:lvl4pPr>
-            <a:lvl5pPr marL="1243767" indent="0">
-              <a:buNone/>
-              <a:defRPr sz="680"/>
+            <a:lvl5pPr marL="1999427" indent="0">
+              <a:buNone/>
+              <a:defRPr sz="1093"/>
             </a:lvl5pPr>
-            <a:lvl6pPr marL="1554709" indent="0">
-              <a:buNone/>
-              <a:defRPr sz="680"/>
+            <a:lvl6pPr marL="2499284" indent="0">
+              <a:buNone/>
+              <a:defRPr sz="1093"/>
             </a:lvl6pPr>
-            <a:lvl7pPr marL="1865650" indent="0">
-              <a:buNone/>
-              <a:defRPr sz="680"/>
+            <a:lvl7pPr marL="2999141" indent="0">
+              <a:buNone/>
+              <a:defRPr sz="1093"/>
             </a:lvl7pPr>
-            <a:lvl8pPr marL="2176592" indent="0">
-              <a:buNone/>
-              <a:defRPr sz="680"/>
+            <a:lvl8pPr marL="3498997" indent="0">
+              <a:buNone/>
+              <a:defRPr sz="1093"/>
             </a:lvl8pPr>
-            <a:lvl9pPr marL="2487534" indent="0">
-              <a:buNone/>
-              <a:defRPr sz="680"/>
+            <a:lvl9pPr marL="3998854" indent="0">
+              <a:buNone/>
+              <a:defRPr sz="1093"/>
             </a:lvl9pPr>
           </a:lstStyle>
           <a:p>
@@ -2358,7 +3235,7 @@
           <a:p>
             <a:fld id="{CF2D9C2E-299D-8F4E-B839-6838C3236DDB}" type="datetimeFigureOut">
               <a:rPr lang="en-US" smtClean="0"/>
-              <a:t>4/14/20</a:t>
+              <a:t>4/15/20</a:t>
             </a:fld>
             <a:endParaRPr lang="en-US"/>
           </a:p>
@@ -2409,7 +3286,7 @@
     </p:spTree>
     <p:extLst>
       <p:ext uri="{BB962C8B-B14F-4D97-AF65-F5344CB8AC3E}">
-        <p14:creationId xmlns:p14="http://schemas.microsoft.com/office/powerpoint/2010/main" val="1943146970"/>
+        <p14:creationId xmlns:p14="http://schemas.microsoft.com/office/powerpoint/2010/main" val="1492749716"/>
       </p:ext>
     </p:extLst>
   </p:cSld>
@@ -2453,8 +3330,8 @@
         </p:nvSpPr>
         <p:spPr>
           <a:xfrm>
-            <a:off x="754380" y="248319"/>
-            <a:ext cx="9464040" cy="901506"/>
+            <a:off x="754380" y="399188"/>
+            <a:ext cx="9464040" cy="1449221"/>
           </a:xfrm>
           <a:prstGeom prst="rect">
             <a:avLst/>
@@ -2486,8 +3363,8 @@
         </p:nvSpPr>
         <p:spPr>
           <a:xfrm>
-            <a:off x="754380" y="1241594"/>
-            <a:ext cx="9464040" cy="2959313"/>
+            <a:off x="754380" y="1995932"/>
+            <a:ext cx="9464040" cy="4757262"/>
           </a:xfrm>
           <a:prstGeom prst="rect">
             <a:avLst/>
@@ -2548,8 +3425,8 @@
         </p:nvSpPr>
         <p:spPr>
           <a:xfrm>
-            <a:off x="754380" y="4322907"/>
-            <a:ext cx="2468880" cy="248319"/>
+            <a:off x="754380" y="6949317"/>
+            <a:ext cx="2468880" cy="399186"/>
           </a:xfrm>
           <a:prstGeom prst="rect">
             <a:avLst/>
@@ -2559,7 +3436,7 @@
           <a:bodyPr vert="horz" lIns="91440" tIns="45720" rIns="91440" bIns="45720" rtlCol="0" anchor="ctr"/>
           <a:lstStyle>
             <a:lvl1pPr algn="l">
-              <a:defRPr sz="816">
+              <a:defRPr sz="1312">
                 <a:solidFill>
                   <a:schemeClr val="tx1">
                     <a:tint val="75000"/>
@@ -2571,7 +3448,7 @@
           <a:p>
             <a:fld id="{CF2D9C2E-299D-8F4E-B839-6838C3236DDB}" type="datetimeFigureOut">
               <a:rPr lang="en-US" smtClean="0"/>
-              <a:t>4/14/20</a:t>
+              <a:t>4/15/20</a:t>
             </a:fld>
             <a:endParaRPr lang="en-US"/>
           </a:p>
@@ -2589,8 +3466,8 @@
         </p:nvSpPr>
         <p:spPr>
           <a:xfrm>
-            <a:off x="3634740" y="4322907"/>
-            <a:ext cx="3703320" cy="248319"/>
+            <a:off x="3634740" y="6949317"/>
+            <a:ext cx="3703320" cy="399186"/>
           </a:xfrm>
           <a:prstGeom prst="rect">
             <a:avLst/>
@@ -2600,7 +3477,7 @@
           <a:bodyPr vert="horz" lIns="91440" tIns="45720" rIns="91440" bIns="45720" rtlCol="0" anchor="ctr"/>
           <a:lstStyle>
             <a:lvl1pPr algn="ctr">
-              <a:defRPr sz="816">
+              <a:defRPr sz="1312">
                 <a:solidFill>
                   <a:schemeClr val="tx1">
                     <a:tint val="75000"/>
@@ -2626,8 +3503,8 @@
         </p:nvSpPr>
         <p:spPr>
           <a:xfrm>
-            <a:off x="7749540" y="4322907"/>
-            <a:ext cx="2468880" cy="248319"/>
+            <a:off x="7749540" y="6949317"/>
+            <a:ext cx="2468880" cy="399186"/>
           </a:xfrm>
           <a:prstGeom prst="rect">
             <a:avLst/>
@@ -2637,7 +3514,7 @@
           <a:bodyPr vert="horz" lIns="91440" tIns="45720" rIns="91440" bIns="45720" rtlCol="0" anchor="ctr"/>
           <a:lstStyle>
             <a:lvl1pPr algn="r">
-              <a:defRPr sz="816">
+              <a:defRPr sz="1312">
                 <a:solidFill>
                   <a:schemeClr val="tx1">
                     <a:tint val="75000"/>
@@ -2658,27 +3535,27 @@
     </p:spTree>
     <p:extLst>
       <p:ext uri="{BB962C8B-B14F-4D97-AF65-F5344CB8AC3E}">
-        <p14:creationId xmlns:p14="http://schemas.microsoft.com/office/powerpoint/2010/main" val="2195860230"/>
+        <p14:creationId xmlns:p14="http://schemas.microsoft.com/office/powerpoint/2010/main" val="4255123494"/>
       </p:ext>
     </p:extLst>
   </p:cSld>
   <p:clrMap bg1="lt1" tx1="dk1" bg2="lt2" tx2="dk2" accent1="accent1" accent2="accent2" accent3="accent3" accent4="accent4" accent5="accent5" accent6="accent6" hlink="hlink" folHlink="folHlink"/>
   <p:sldLayoutIdLst>
-    <p:sldLayoutId id="2147483673" r:id="rId1"/>
-    <p:sldLayoutId id="2147483674" r:id="rId2"/>
-    <p:sldLayoutId id="2147483675" r:id="rId3"/>
-    <p:sldLayoutId id="2147483676" r:id="rId4"/>
-    <p:sldLayoutId id="2147483677" r:id="rId5"/>
-    <p:sldLayoutId id="2147483678" r:id="rId6"/>
-    <p:sldLayoutId id="2147483679" r:id="rId7"/>
-    <p:sldLayoutId id="2147483680" r:id="rId8"/>
-    <p:sldLayoutId id="2147483681" r:id="rId9"/>
-    <p:sldLayoutId id="2147483682" r:id="rId10"/>
-    <p:sldLayoutId id="2147483683" r:id="rId11"/>
+    <p:sldLayoutId id="2147483697" r:id="rId1"/>
+    <p:sldLayoutId id="2147483698" r:id="rId2"/>
+    <p:sldLayoutId id="2147483699" r:id="rId3"/>
+    <p:sldLayoutId id="2147483700" r:id="rId4"/>
+    <p:sldLayoutId id="2147483701" r:id="rId5"/>
+    <p:sldLayoutId id="2147483702" r:id="rId6"/>
+    <p:sldLayoutId id="2147483703" r:id="rId7"/>
+    <p:sldLayoutId id="2147483704" r:id="rId8"/>
+    <p:sldLayoutId id="2147483705" r:id="rId9"/>
+    <p:sldLayoutId id="2147483706" r:id="rId10"/>
+    <p:sldLayoutId id="2147483707" r:id="rId11"/>
   </p:sldLayoutIdLst>
   <p:txStyles>
     <p:titleStyle>
-      <a:lvl1pPr algn="l" defTabSz="621883" rtl="0" eaLnBrk="1" latinLnBrk="0" hangingPunct="1">
+      <a:lvl1pPr algn="l" defTabSz="999714" rtl="0" eaLnBrk="1" latinLnBrk="0" hangingPunct="1">
         <a:lnSpc>
           <a:spcPct val="90000"/>
         </a:lnSpc>
@@ -2686,7 +3563,7 @@
           <a:spcPct val="0"/>
         </a:spcBef>
         <a:buNone/>
-        <a:defRPr sz="2992" kern="1200">
+        <a:defRPr sz="4811" kern="1200">
           <a:solidFill>
             <a:schemeClr val="tx1"/>
           </a:solidFill>
@@ -2697,16 +3574,16 @@
       </a:lvl1pPr>
     </p:titleStyle>
     <p:bodyStyle>
-      <a:lvl1pPr marL="155471" indent="-155471" algn="l" defTabSz="621883" rtl="0" eaLnBrk="1" latinLnBrk="0" hangingPunct="1">
+      <a:lvl1pPr marL="249928" indent="-249928" algn="l" defTabSz="999714" rtl="0" eaLnBrk="1" latinLnBrk="0" hangingPunct="1">
         <a:lnSpc>
           <a:spcPct val="90000"/>
         </a:lnSpc>
         <a:spcBef>
-          <a:spcPts val="680"/>
+          <a:spcPts val="1093"/>
         </a:spcBef>
         <a:buFont typeface="Arial" panose="020B0604020202020204" pitchFamily="34" charset="0"/>
         <a:buChar char="•"/>
-        <a:defRPr sz="1904" kern="1200">
+        <a:defRPr sz="3061" kern="1200">
           <a:solidFill>
             <a:schemeClr val="tx1"/>
           </a:solidFill>
@@ -2715,16 +3592,16 @@
           <a:cs typeface="+mn-cs"/>
         </a:defRPr>
       </a:lvl1pPr>
-      <a:lvl2pPr marL="466413" indent="-155471" algn="l" defTabSz="621883" rtl="0" eaLnBrk="1" latinLnBrk="0" hangingPunct="1">
+      <a:lvl2pPr marL="749785" indent="-249928" algn="l" defTabSz="999714" rtl="0" eaLnBrk="1" latinLnBrk="0" hangingPunct="1">
         <a:lnSpc>
           <a:spcPct val="90000"/>
         </a:lnSpc>
         <a:spcBef>
-          <a:spcPts val="340"/>
+          <a:spcPts val="547"/>
         </a:spcBef>
         <a:buFont typeface="Arial" panose="020B0604020202020204" pitchFamily="34" charset="0"/>
         <a:buChar char="•"/>
-        <a:defRPr sz="1632" kern="1200">
+        <a:defRPr sz="2624" kern="1200">
           <a:solidFill>
             <a:schemeClr val="tx1"/>
           </a:solidFill>
@@ -2733,16 +3610,16 @@
           <a:cs typeface="+mn-cs"/>
         </a:defRPr>
       </a:lvl2pPr>
-      <a:lvl3pPr marL="777354" indent="-155471" algn="l" defTabSz="621883" rtl="0" eaLnBrk="1" latinLnBrk="0" hangingPunct="1">
+      <a:lvl3pPr marL="1249642" indent="-249928" algn="l" defTabSz="999714" rtl="0" eaLnBrk="1" latinLnBrk="0" hangingPunct="1">
         <a:lnSpc>
           <a:spcPct val="90000"/>
         </a:lnSpc>
         <a:spcBef>
-          <a:spcPts val="340"/>
+          <a:spcPts val="547"/>
         </a:spcBef>
         <a:buFont typeface="Arial" panose="020B0604020202020204" pitchFamily="34" charset="0"/>
         <a:buChar char="•"/>
-        <a:defRPr sz="1360" kern="1200">
+        <a:defRPr sz="2187" kern="1200">
           <a:solidFill>
             <a:schemeClr val="tx1"/>
           </a:solidFill>
@@ -2751,16 +3628,16 @@
           <a:cs typeface="+mn-cs"/>
         </a:defRPr>
       </a:lvl3pPr>
-      <a:lvl4pPr marL="1088296" indent="-155471" algn="l" defTabSz="621883" rtl="0" eaLnBrk="1" latinLnBrk="0" hangingPunct="1">
+      <a:lvl4pPr marL="1749499" indent="-249928" algn="l" defTabSz="999714" rtl="0" eaLnBrk="1" latinLnBrk="0" hangingPunct="1">
         <a:lnSpc>
           <a:spcPct val="90000"/>
         </a:lnSpc>
         <a:spcBef>
-          <a:spcPts val="340"/>
+          <a:spcPts val="547"/>
         </a:spcBef>
         <a:buFont typeface="Arial" panose="020B0604020202020204" pitchFamily="34" charset="0"/>
         <a:buChar char="•"/>
-        <a:defRPr sz="1224" kern="1200">
+        <a:defRPr sz="1968" kern="1200">
           <a:solidFill>
             <a:schemeClr val="tx1"/>
           </a:solidFill>
@@ -2769,16 +3646,16 @@
           <a:cs typeface="+mn-cs"/>
         </a:defRPr>
       </a:lvl4pPr>
-      <a:lvl5pPr marL="1399238" indent="-155471" algn="l" defTabSz="621883" rtl="0" eaLnBrk="1" latinLnBrk="0" hangingPunct="1">
+      <a:lvl5pPr marL="2249355" indent="-249928" algn="l" defTabSz="999714" rtl="0" eaLnBrk="1" latinLnBrk="0" hangingPunct="1">
         <a:lnSpc>
           <a:spcPct val="90000"/>
         </a:lnSpc>
         <a:spcBef>
-          <a:spcPts val="340"/>
+          <a:spcPts val="547"/>
         </a:spcBef>
         <a:buFont typeface="Arial" panose="020B0604020202020204" pitchFamily="34" charset="0"/>
         <a:buChar char="•"/>
-        <a:defRPr sz="1224" kern="1200">
+        <a:defRPr sz="1968" kern="1200">
           <a:solidFill>
             <a:schemeClr val="tx1"/>
           </a:solidFill>
@@ -2787,16 +3664,16 @@
           <a:cs typeface="+mn-cs"/>
         </a:defRPr>
       </a:lvl5pPr>
-      <a:lvl6pPr marL="1710179" indent="-155471" algn="l" defTabSz="621883" rtl="0" eaLnBrk="1" latinLnBrk="0" hangingPunct="1">
+      <a:lvl6pPr marL="2749212" indent="-249928" algn="l" defTabSz="999714" rtl="0" eaLnBrk="1" latinLnBrk="0" hangingPunct="1">
         <a:lnSpc>
           <a:spcPct val="90000"/>
         </a:lnSpc>
         <a:spcBef>
-          <a:spcPts val="340"/>
+          <a:spcPts val="547"/>
         </a:spcBef>
         <a:buFont typeface="Arial" panose="020B0604020202020204" pitchFamily="34" charset="0"/>
         <a:buChar char="•"/>
-        <a:defRPr sz="1224" kern="1200">
+        <a:defRPr sz="1968" kern="1200">
           <a:solidFill>
             <a:schemeClr val="tx1"/>
           </a:solidFill>
@@ -2805,16 +3682,16 @@
           <a:cs typeface="+mn-cs"/>
         </a:defRPr>
       </a:lvl6pPr>
-      <a:lvl7pPr marL="2021121" indent="-155471" algn="l" defTabSz="621883" rtl="0" eaLnBrk="1" latinLnBrk="0" hangingPunct="1">
+      <a:lvl7pPr marL="3249069" indent="-249928" algn="l" defTabSz="999714" rtl="0" eaLnBrk="1" latinLnBrk="0" hangingPunct="1">
         <a:lnSpc>
           <a:spcPct val="90000"/>
         </a:lnSpc>
         <a:spcBef>
-          <a:spcPts val="340"/>
+          <a:spcPts val="547"/>
         </a:spcBef>
         <a:buFont typeface="Arial" panose="020B0604020202020204" pitchFamily="34" charset="0"/>
         <a:buChar char="•"/>
-        <a:defRPr sz="1224" kern="1200">
+        <a:defRPr sz="1968" kern="1200">
           <a:solidFill>
             <a:schemeClr val="tx1"/>
           </a:solidFill>
@@ -2823,16 +3700,16 @@
           <a:cs typeface="+mn-cs"/>
         </a:defRPr>
       </a:lvl7pPr>
-      <a:lvl8pPr marL="2332063" indent="-155471" algn="l" defTabSz="621883" rtl="0" eaLnBrk="1" latinLnBrk="0" hangingPunct="1">
+      <a:lvl8pPr marL="3748926" indent="-249928" algn="l" defTabSz="999714" rtl="0" eaLnBrk="1" latinLnBrk="0" hangingPunct="1">
         <a:lnSpc>
           <a:spcPct val="90000"/>
         </a:lnSpc>
         <a:spcBef>
-          <a:spcPts val="340"/>
+          <a:spcPts val="547"/>
         </a:spcBef>
         <a:buFont typeface="Arial" panose="020B0604020202020204" pitchFamily="34" charset="0"/>
         <a:buChar char="•"/>
-        <a:defRPr sz="1224" kern="1200">
+        <a:defRPr sz="1968" kern="1200">
           <a:solidFill>
             <a:schemeClr val="tx1"/>
           </a:solidFill>
@@ -2841,16 +3718,16 @@
           <a:cs typeface="+mn-cs"/>
         </a:defRPr>
       </a:lvl8pPr>
-      <a:lvl9pPr marL="2643005" indent="-155471" algn="l" defTabSz="621883" rtl="0" eaLnBrk="1" latinLnBrk="0" hangingPunct="1">
+      <a:lvl9pPr marL="4248782" indent="-249928" algn="l" defTabSz="999714" rtl="0" eaLnBrk="1" latinLnBrk="0" hangingPunct="1">
         <a:lnSpc>
           <a:spcPct val="90000"/>
         </a:lnSpc>
         <a:spcBef>
-          <a:spcPts val="340"/>
+          <a:spcPts val="547"/>
         </a:spcBef>
         <a:buFont typeface="Arial" panose="020B0604020202020204" pitchFamily="34" charset="0"/>
         <a:buChar char="•"/>
-        <a:defRPr sz="1224" kern="1200">
+        <a:defRPr sz="1968" kern="1200">
           <a:solidFill>
             <a:schemeClr val="tx1"/>
           </a:solidFill>
@@ -2864,8 +3741,8 @@
       <a:defPPr>
         <a:defRPr lang="en-US"/>
       </a:defPPr>
-      <a:lvl1pPr marL="0" algn="l" defTabSz="621883" rtl="0" eaLnBrk="1" latinLnBrk="0" hangingPunct="1">
-        <a:defRPr sz="1224" kern="1200">
+      <a:lvl1pPr marL="0" algn="l" defTabSz="999714" rtl="0" eaLnBrk="1" latinLnBrk="0" hangingPunct="1">
+        <a:defRPr sz="1968" kern="1200">
           <a:solidFill>
             <a:schemeClr val="tx1"/>
           </a:solidFill>
@@ -2874,8 +3751,8 @@
           <a:cs typeface="+mn-cs"/>
         </a:defRPr>
       </a:lvl1pPr>
-      <a:lvl2pPr marL="310942" algn="l" defTabSz="621883" rtl="0" eaLnBrk="1" latinLnBrk="0" hangingPunct="1">
-        <a:defRPr sz="1224" kern="1200">
+      <a:lvl2pPr marL="499857" algn="l" defTabSz="999714" rtl="0" eaLnBrk="1" latinLnBrk="0" hangingPunct="1">
+        <a:defRPr sz="1968" kern="1200">
           <a:solidFill>
             <a:schemeClr val="tx1"/>
           </a:solidFill>
@@ -2884,8 +3761,8 @@
           <a:cs typeface="+mn-cs"/>
         </a:defRPr>
       </a:lvl2pPr>
-      <a:lvl3pPr marL="621883" algn="l" defTabSz="621883" rtl="0" eaLnBrk="1" latinLnBrk="0" hangingPunct="1">
-        <a:defRPr sz="1224" kern="1200">
+      <a:lvl3pPr marL="999714" algn="l" defTabSz="999714" rtl="0" eaLnBrk="1" latinLnBrk="0" hangingPunct="1">
+        <a:defRPr sz="1968" kern="1200">
           <a:solidFill>
             <a:schemeClr val="tx1"/>
           </a:solidFill>
@@ -2894,8 +3771,8 @@
           <a:cs typeface="+mn-cs"/>
         </a:defRPr>
       </a:lvl3pPr>
-      <a:lvl4pPr marL="932825" algn="l" defTabSz="621883" rtl="0" eaLnBrk="1" latinLnBrk="0" hangingPunct="1">
-        <a:defRPr sz="1224" kern="1200">
+      <a:lvl4pPr marL="1499570" algn="l" defTabSz="999714" rtl="0" eaLnBrk="1" latinLnBrk="0" hangingPunct="1">
+        <a:defRPr sz="1968" kern="1200">
           <a:solidFill>
             <a:schemeClr val="tx1"/>
           </a:solidFill>
@@ -2904,8 +3781,8 @@
           <a:cs typeface="+mn-cs"/>
         </a:defRPr>
       </a:lvl4pPr>
-      <a:lvl5pPr marL="1243767" algn="l" defTabSz="621883" rtl="0" eaLnBrk="1" latinLnBrk="0" hangingPunct="1">
-        <a:defRPr sz="1224" kern="1200">
+      <a:lvl5pPr marL="1999427" algn="l" defTabSz="999714" rtl="0" eaLnBrk="1" latinLnBrk="0" hangingPunct="1">
+        <a:defRPr sz="1968" kern="1200">
           <a:solidFill>
             <a:schemeClr val="tx1"/>
           </a:solidFill>
@@ -2914,8 +3791,8 @@
           <a:cs typeface="+mn-cs"/>
         </a:defRPr>
       </a:lvl5pPr>
-      <a:lvl6pPr marL="1554709" algn="l" defTabSz="621883" rtl="0" eaLnBrk="1" latinLnBrk="0" hangingPunct="1">
-        <a:defRPr sz="1224" kern="1200">
+      <a:lvl6pPr marL="2499284" algn="l" defTabSz="999714" rtl="0" eaLnBrk="1" latinLnBrk="0" hangingPunct="1">
+        <a:defRPr sz="1968" kern="1200">
           <a:solidFill>
             <a:schemeClr val="tx1"/>
           </a:solidFill>
@@ -2924,8 +3801,8 @@
           <a:cs typeface="+mn-cs"/>
         </a:defRPr>
       </a:lvl6pPr>
-      <a:lvl7pPr marL="1865650" algn="l" defTabSz="621883" rtl="0" eaLnBrk="1" latinLnBrk="0" hangingPunct="1">
-        <a:defRPr sz="1224" kern="1200">
+      <a:lvl7pPr marL="2999141" algn="l" defTabSz="999714" rtl="0" eaLnBrk="1" latinLnBrk="0" hangingPunct="1">
+        <a:defRPr sz="1968" kern="1200">
           <a:solidFill>
             <a:schemeClr val="tx1"/>
           </a:solidFill>
@@ -2934,8 +3811,8 @@
           <a:cs typeface="+mn-cs"/>
         </a:defRPr>
       </a:lvl7pPr>
-      <a:lvl8pPr marL="2176592" algn="l" defTabSz="621883" rtl="0" eaLnBrk="1" latinLnBrk="0" hangingPunct="1">
-        <a:defRPr sz="1224" kern="1200">
+      <a:lvl8pPr marL="3498997" algn="l" defTabSz="999714" rtl="0" eaLnBrk="1" latinLnBrk="0" hangingPunct="1">
+        <a:defRPr sz="1968" kern="1200">
           <a:solidFill>
             <a:schemeClr val="tx1"/>
           </a:solidFill>
@@ -2944,8 +3821,8 @@
           <a:cs typeface="+mn-cs"/>
         </a:defRPr>
       </a:lvl8pPr>
-      <a:lvl9pPr marL="2487534" algn="l" defTabSz="621883" rtl="0" eaLnBrk="1" latinLnBrk="0" hangingPunct="1">
-        <a:defRPr sz="1224" kern="1200">
+      <a:lvl9pPr marL="3998854" algn="l" defTabSz="999714" rtl="0" eaLnBrk="1" latinLnBrk="0" hangingPunct="1">
+        <a:defRPr sz="1968" kern="1200">
           <a:solidFill>
             <a:schemeClr val="tx1"/>
           </a:solidFill>
@@ -2978,10 +3855,10 @@
       </p:grpSpPr>
       <p:grpSp>
         <p:nvGrpSpPr>
-          <p:cNvPr id="17" name="Group 16">
+          <p:cNvPr id="30" name="Group 29">
             <a:extLst>
               <a:ext uri="{FF2B5EF4-FFF2-40B4-BE49-F238E27FC236}">
-                <a16:creationId xmlns:a16="http://schemas.microsoft.com/office/drawing/2014/main" id="{B9C142DC-1D1B-F649-9422-954CBDD24406}"/>
+                <a16:creationId xmlns:a16="http://schemas.microsoft.com/office/drawing/2014/main" id="{51C49904-0780-0346-ABAB-EAB84ACC90B6}"/>
               </a:ext>
             </a:extLst>
           </p:cNvPr>
@@ -2998,10 +3875,10 @@
         </p:grpSpPr>
         <p:pic>
           <p:nvPicPr>
-            <p:cNvPr id="18" name="Picture 17">
+            <p:cNvPr id="31" name="Picture 30">
               <a:extLst>
                 <a:ext uri="{FF2B5EF4-FFF2-40B4-BE49-F238E27FC236}">
-                  <a16:creationId xmlns:a16="http://schemas.microsoft.com/office/drawing/2014/main" id="{3D30D09F-FCA9-DB45-B6D4-BA7774D8CC43}"/>
+                  <a16:creationId xmlns:a16="http://schemas.microsoft.com/office/drawing/2014/main" id="{FA342735-974C-6349-9D98-25C53E28A1B4}"/>
                 </a:ext>
               </a:extLst>
             </p:cNvPr>
@@ -3028,10 +3905,10 @@
         </p:pic>
         <p:pic>
           <p:nvPicPr>
-            <p:cNvPr id="19" name="Picture 18">
+            <p:cNvPr id="32" name="Picture 31">
               <a:extLst>
                 <a:ext uri="{FF2B5EF4-FFF2-40B4-BE49-F238E27FC236}">
-                  <a16:creationId xmlns:a16="http://schemas.microsoft.com/office/drawing/2014/main" id="{A328B911-3DBB-E048-89F3-B7F564ACEA80}"/>
+                  <a16:creationId xmlns:a16="http://schemas.microsoft.com/office/drawing/2014/main" id="{5D871B5C-C0CC-2049-8EE4-39B41344A9CA}"/>
                 </a:ext>
               </a:extLst>
             </p:cNvPr>
@@ -3058,10 +3935,10 @@
         </p:pic>
         <p:sp>
           <p:nvSpPr>
-            <p:cNvPr id="20" name="TextBox 19">
+            <p:cNvPr id="33" name="TextBox 32">
               <a:extLst>
                 <a:ext uri="{FF2B5EF4-FFF2-40B4-BE49-F238E27FC236}">
-                  <a16:creationId xmlns:a16="http://schemas.microsoft.com/office/drawing/2014/main" id="{8FFA25D9-E713-1D4F-B3FC-F99BAD1625C1}"/>
+                  <a16:creationId xmlns:a16="http://schemas.microsoft.com/office/drawing/2014/main" id="{0AE36058-A69F-4546-8C77-ADD57E28048B}"/>
                 </a:ext>
               </a:extLst>
             </p:cNvPr>
@@ -3096,10 +3973,10 @@
         </p:sp>
         <p:sp>
           <p:nvSpPr>
-            <p:cNvPr id="21" name="TextBox 20">
+            <p:cNvPr id="34" name="TextBox 33">
               <a:extLst>
                 <a:ext uri="{FF2B5EF4-FFF2-40B4-BE49-F238E27FC236}">
-                  <a16:creationId xmlns:a16="http://schemas.microsoft.com/office/drawing/2014/main" id="{1A8BA472-703F-8341-9FD6-9DDAEFC8DAFE}"/>
+                  <a16:creationId xmlns:a16="http://schemas.microsoft.com/office/drawing/2014/main" id="{3EF38BF9-28C2-3845-98F0-AD9502F31D2D}"/>
                 </a:ext>
               </a:extLst>
             </p:cNvPr>
@@ -3133,6 +4010,579 @@
           </p:txBody>
         </p:sp>
       </p:grpSp>
+      <p:grpSp>
+        <p:nvGrpSpPr>
+          <p:cNvPr id="35" name="Group 34">
+            <a:extLst>
+              <a:ext uri="{FF2B5EF4-FFF2-40B4-BE49-F238E27FC236}">
+                <a16:creationId xmlns:a16="http://schemas.microsoft.com/office/drawing/2014/main" id="{A76B6796-FF9F-A848-91C2-4DE9D8E58585}"/>
+              </a:ext>
+            </a:extLst>
+          </p:cNvPr>
+          <p:cNvGrpSpPr/>
+          <p:nvPr/>
+        </p:nvGrpSpPr>
+        <p:grpSpPr>
+          <a:xfrm>
+            <a:off x="317503" y="4985553"/>
+            <a:ext cx="10709965" cy="2454515"/>
+            <a:chOff x="203617" y="195365"/>
+            <a:chExt cx="10709965" cy="2454515"/>
+          </a:xfrm>
+        </p:grpSpPr>
+        <p:sp>
+          <p:nvSpPr>
+            <p:cNvPr id="36" name="TextBox 35">
+              <a:extLst>
+                <a:ext uri="{FF2B5EF4-FFF2-40B4-BE49-F238E27FC236}">
+                  <a16:creationId xmlns:a16="http://schemas.microsoft.com/office/drawing/2014/main" id="{55B0701C-D9A8-9A45-B97C-4348380CC216}"/>
+                </a:ext>
+              </a:extLst>
+            </p:cNvPr>
+            <p:cNvSpPr txBox="1"/>
+            <p:nvPr/>
+          </p:nvSpPr>
+          <p:spPr>
+            <a:xfrm>
+              <a:off x="880676" y="543017"/>
+              <a:ext cx="1090363" cy="307777"/>
+            </a:xfrm>
+            <a:prstGeom prst="rect">
+              <a:avLst/>
+            </a:prstGeom>
+            <a:noFill/>
+          </p:spPr>
+          <p:txBody>
+            <a:bodyPr wrap="none" rtlCol="0">
+              <a:spAutoFit/>
+            </a:bodyPr>
+            <a:lstStyle/>
+            <a:p>
+              <a:r>
+                <a:rPr lang="en-US" sz="1400" i="1" dirty="0">
+                  <a:latin typeface="Arial" panose="020B0604020202020204" pitchFamily="34" charset="0"/>
+                  <a:cs typeface="Arial" panose="020B0604020202020204" pitchFamily="34" charset="0"/>
+                </a:rPr>
+                <a:t>Bright Field</a:t>
+              </a:r>
+            </a:p>
+          </p:txBody>
+        </p:sp>
+        <p:sp>
+          <p:nvSpPr>
+            <p:cNvPr id="37" name="TextBox 36">
+              <a:extLst>
+                <a:ext uri="{FF2B5EF4-FFF2-40B4-BE49-F238E27FC236}">
+                  <a16:creationId xmlns:a16="http://schemas.microsoft.com/office/drawing/2014/main" id="{2BB19E0C-1722-3747-900F-4143B570B309}"/>
+                </a:ext>
+              </a:extLst>
+            </p:cNvPr>
+            <p:cNvSpPr txBox="1"/>
+            <p:nvPr/>
+          </p:nvSpPr>
+          <p:spPr>
+            <a:xfrm>
+              <a:off x="3332070" y="543017"/>
+              <a:ext cx="1258678" cy="307777"/>
+            </a:xfrm>
+            <a:prstGeom prst="rect">
+              <a:avLst/>
+            </a:prstGeom>
+            <a:noFill/>
+          </p:spPr>
+          <p:txBody>
+            <a:bodyPr wrap="none" rtlCol="0">
+              <a:spAutoFit/>
+            </a:bodyPr>
+            <a:lstStyle/>
+            <a:p>
+              <a:r>
+                <a:rPr lang="en-US" sz="1400" i="1" dirty="0">
+                  <a:latin typeface="Arial" panose="020B0604020202020204" pitchFamily="34" charset="0"/>
+                  <a:cs typeface="Arial" panose="020B0604020202020204" pitchFamily="34" charset="0"/>
+                </a:rPr>
+                <a:t>Fluorescence</a:t>
+              </a:r>
+            </a:p>
+          </p:txBody>
+        </p:sp>
+        <p:sp>
+          <p:nvSpPr>
+            <p:cNvPr id="38" name="TextBox 37">
+              <a:extLst>
+                <a:ext uri="{FF2B5EF4-FFF2-40B4-BE49-F238E27FC236}">
+                  <a16:creationId xmlns:a16="http://schemas.microsoft.com/office/drawing/2014/main" id="{7B95F309-480F-114E-8F0E-EE3777AB4811}"/>
+                </a:ext>
+              </a:extLst>
+            </p:cNvPr>
+            <p:cNvSpPr txBox="1"/>
+            <p:nvPr/>
+          </p:nvSpPr>
+          <p:spPr>
+            <a:xfrm>
+              <a:off x="829183" y="201966"/>
+              <a:ext cx="3728906" cy="338554"/>
+            </a:xfrm>
+            <a:prstGeom prst="rect">
+              <a:avLst/>
+            </a:prstGeom>
+            <a:noFill/>
+          </p:spPr>
+          <p:txBody>
+            <a:bodyPr wrap="none" rtlCol="0">
+              <a:spAutoFit/>
+            </a:bodyPr>
+            <a:lstStyle/>
+            <a:p>
+              <a:pPr algn="ctr"/>
+              <a:r>
+                <a:rPr lang="en-US" sz="1600" dirty="0">
+                  <a:latin typeface="Arial" panose="020B0604020202020204" pitchFamily="34" charset="0"/>
+                  <a:cs typeface="Arial" panose="020B0604020202020204" pitchFamily="34" charset="0"/>
+                </a:rPr>
+                <a:t>Spike </a:t>
+              </a:r>
+              <a:r>
+                <a:rPr lang="en-US" sz="1600" dirty="0" err="1">
+                  <a:latin typeface="Arial" panose="020B0604020202020204" pitchFamily="34" charset="0"/>
+                  <a:cs typeface="Arial" panose="020B0604020202020204" pitchFamily="34" charset="0"/>
+                </a:rPr>
+                <a:t>pseudotyped</a:t>
+              </a:r>
+              <a:r>
+                <a:rPr lang="en-US" sz="1600" dirty="0">
+                  <a:latin typeface="Arial" panose="020B0604020202020204" pitchFamily="34" charset="0"/>
+                  <a:cs typeface="Arial" panose="020B0604020202020204" pitchFamily="34" charset="0"/>
+                </a:rPr>
+                <a:t> </a:t>
+              </a:r>
+              <a:r>
+                <a:rPr lang="en-US" sz="1600" dirty="0" err="1">
+                  <a:latin typeface="Arial" panose="020B0604020202020204" pitchFamily="34" charset="0"/>
+                  <a:cs typeface="Arial" panose="020B0604020202020204" pitchFamily="34" charset="0"/>
+                </a:rPr>
+                <a:t>ZsGreen</a:t>
+              </a:r>
+              <a:r>
+                <a:rPr lang="en-US" sz="1600" dirty="0">
+                  <a:latin typeface="Arial" panose="020B0604020202020204" pitchFamily="34" charset="0"/>
+                  <a:cs typeface="Arial" panose="020B0604020202020204" pitchFamily="34" charset="0"/>
+                </a:rPr>
+                <a:t> backbone</a:t>
+              </a:r>
+            </a:p>
+          </p:txBody>
+        </p:sp>
+        <p:sp>
+          <p:nvSpPr>
+            <p:cNvPr id="39" name="TextBox 38">
+              <a:extLst>
+                <a:ext uri="{FF2B5EF4-FFF2-40B4-BE49-F238E27FC236}">
+                  <a16:creationId xmlns:a16="http://schemas.microsoft.com/office/drawing/2014/main" id="{D39D4AFA-08F6-7E4B-8483-6E14F2277E49}"/>
+                </a:ext>
+              </a:extLst>
+            </p:cNvPr>
+            <p:cNvSpPr txBox="1"/>
+            <p:nvPr/>
+          </p:nvSpPr>
+          <p:spPr>
+            <a:xfrm>
+              <a:off x="5623351" y="195365"/>
+              <a:ext cx="5290231" cy="338554"/>
+            </a:xfrm>
+            <a:prstGeom prst="rect">
+              <a:avLst/>
+            </a:prstGeom>
+            <a:noFill/>
+          </p:spPr>
+          <p:txBody>
+            <a:bodyPr wrap="none" rtlCol="0">
+              <a:spAutoFit/>
+            </a:bodyPr>
+            <a:lstStyle/>
+            <a:p>
+              <a:pPr algn="ctr"/>
+              <a:r>
+                <a:rPr lang="en-US" sz="1600" dirty="0">
+                  <a:latin typeface="Arial" panose="020B0604020202020204" pitchFamily="34" charset="0"/>
+                  <a:cs typeface="Arial" panose="020B0604020202020204" pitchFamily="34" charset="0"/>
+                </a:rPr>
+                <a:t>Spike </a:t>
+              </a:r>
+              <a:r>
+                <a:rPr lang="en-US" sz="1600" dirty="0" err="1">
+                  <a:latin typeface="Arial" panose="020B0604020202020204" pitchFamily="34" charset="0"/>
+                  <a:cs typeface="Arial" panose="020B0604020202020204" pitchFamily="34" charset="0"/>
+                </a:rPr>
+                <a:t>pseudotyped</a:t>
+              </a:r>
+              <a:r>
+                <a:rPr lang="en-US" sz="1600" dirty="0">
+                  <a:latin typeface="Arial" panose="020B0604020202020204" pitchFamily="34" charset="0"/>
+                  <a:cs typeface="Arial" panose="020B0604020202020204" pitchFamily="34" charset="0"/>
+                </a:rPr>
+                <a:t> Luciferase-IRES-</a:t>
+              </a:r>
+              <a:r>
+                <a:rPr lang="en-US" sz="1600" dirty="0" err="1">
+                  <a:latin typeface="Arial" panose="020B0604020202020204" pitchFamily="34" charset="0"/>
+                  <a:cs typeface="Arial" panose="020B0604020202020204" pitchFamily="34" charset="0"/>
+                </a:rPr>
+                <a:t>ZsGreen</a:t>
+              </a:r>
+              <a:r>
+                <a:rPr lang="en-US" sz="1600" dirty="0">
+                  <a:latin typeface="Arial" panose="020B0604020202020204" pitchFamily="34" charset="0"/>
+                  <a:cs typeface="Arial" panose="020B0604020202020204" pitchFamily="34" charset="0"/>
+                </a:rPr>
+                <a:t> backbone</a:t>
+              </a:r>
+            </a:p>
+          </p:txBody>
+        </p:sp>
+        <p:sp>
+          <p:nvSpPr>
+            <p:cNvPr id="40" name="TextBox 39">
+              <a:extLst>
+                <a:ext uri="{FF2B5EF4-FFF2-40B4-BE49-F238E27FC236}">
+                  <a16:creationId xmlns:a16="http://schemas.microsoft.com/office/drawing/2014/main" id="{C6507B3D-B7AC-5E44-B2AE-65A48DB9D271}"/>
+                </a:ext>
+              </a:extLst>
+            </p:cNvPr>
+            <p:cNvSpPr txBox="1"/>
+            <p:nvPr/>
+          </p:nvSpPr>
+          <p:spPr>
+            <a:xfrm>
+              <a:off x="6455506" y="543017"/>
+              <a:ext cx="1090363" cy="307777"/>
+            </a:xfrm>
+            <a:prstGeom prst="rect">
+              <a:avLst/>
+            </a:prstGeom>
+            <a:noFill/>
+          </p:spPr>
+          <p:txBody>
+            <a:bodyPr wrap="none" rtlCol="0">
+              <a:spAutoFit/>
+            </a:bodyPr>
+            <a:lstStyle/>
+            <a:p>
+              <a:pPr algn="ctr"/>
+              <a:r>
+                <a:rPr lang="en-US" sz="1400" i="1" dirty="0">
+                  <a:latin typeface="Arial" panose="020B0604020202020204" pitchFamily="34" charset="0"/>
+                  <a:cs typeface="Arial" panose="020B0604020202020204" pitchFamily="34" charset="0"/>
+                </a:rPr>
+                <a:t>Bright Field</a:t>
+              </a:r>
+            </a:p>
+          </p:txBody>
+        </p:sp>
+        <p:sp>
+          <p:nvSpPr>
+            <p:cNvPr id="41" name="TextBox 40">
+              <a:extLst>
+                <a:ext uri="{FF2B5EF4-FFF2-40B4-BE49-F238E27FC236}">
+                  <a16:creationId xmlns:a16="http://schemas.microsoft.com/office/drawing/2014/main" id="{DA58D8EC-59B0-5B43-8FB1-84D935E3078E}"/>
+                </a:ext>
+              </a:extLst>
+            </p:cNvPr>
+            <p:cNvSpPr txBox="1"/>
+            <p:nvPr/>
+          </p:nvSpPr>
+          <p:spPr>
+            <a:xfrm>
+              <a:off x="8906900" y="543017"/>
+              <a:ext cx="1258678" cy="307777"/>
+            </a:xfrm>
+            <a:prstGeom prst="rect">
+              <a:avLst/>
+            </a:prstGeom>
+            <a:noFill/>
+          </p:spPr>
+          <p:txBody>
+            <a:bodyPr wrap="none" rtlCol="0">
+              <a:spAutoFit/>
+            </a:bodyPr>
+            <a:lstStyle/>
+            <a:p>
+              <a:pPr algn="ctr"/>
+              <a:r>
+                <a:rPr lang="en-US" sz="1400" i="1" dirty="0">
+                  <a:latin typeface="Arial" panose="020B0604020202020204" pitchFamily="34" charset="0"/>
+                  <a:cs typeface="Arial" panose="020B0604020202020204" pitchFamily="34" charset="0"/>
+                </a:rPr>
+                <a:t>Fluorescence</a:t>
+              </a:r>
+            </a:p>
+          </p:txBody>
+        </p:sp>
+        <p:cxnSp>
+          <p:nvCxnSpPr>
+            <p:cNvPr id="42" name="Straight Connector 41">
+              <a:extLst>
+                <a:ext uri="{FF2B5EF4-FFF2-40B4-BE49-F238E27FC236}">
+                  <a16:creationId xmlns:a16="http://schemas.microsoft.com/office/drawing/2014/main" id="{EB481F3D-D960-4F4B-945C-E030E2BD7554}"/>
+                </a:ext>
+              </a:extLst>
+            </p:cNvPr>
+            <p:cNvCxnSpPr/>
+            <p:nvPr/>
+          </p:nvCxnSpPr>
+          <p:spPr>
+            <a:xfrm>
+              <a:off x="407633" y="541768"/>
+              <a:ext cx="4572000" cy="0"/>
+            </a:xfrm>
+            <a:prstGeom prst="line">
+              <a:avLst/>
+            </a:prstGeom>
+            <a:ln w="12700">
+              <a:solidFill>
+                <a:schemeClr val="tx1"/>
+              </a:solidFill>
+            </a:ln>
+          </p:spPr>
+          <p:style>
+            <a:lnRef idx="1">
+              <a:schemeClr val="accent1"/>
+            </a:lnRef>
+            <a:fillRef idx="0">
+              <a:schemeClr val="accent1"/>
+            </a:fillRef>
+            <a:effectRef idx="0">
+              <a:schemeClr val="accent1"/>
+            </a:effectRef>
+            <a:fontRef idx="minor">
+              <a:schemeClr val="tx1"/>
+            </a:fontRef>
+          </p:style>
+        </p:cxnSp>
+        <p:cxnSp>
+          <p:nvCxnSpPr>
+            <p:cNvPr id="43" name="Straight Connector 42">
+              <a:extLst>
+                <a:ext uri="{FF2B5EF4-FFF2-40B4-BE49-F238E27FC236}">
+                  <a16:creationId xmlns:a16="http://schemas.microsoft.com/office/drawing/2014/main" id="{6FF8CC19-ED2A-7649-B754-70CAB0ACE181}"/>
+                </a:ext>
+              </a:extLst>
+            </p:cNvPr>
+            <p:cNvCxnSpPr/>
+            <p:nvPr/>
+          </p:nvCxnSpPr>
+          <p:spPr>
+            <a:xfrm>
+              <a:off x="5982463" y="541768"/>
+              <a:ext cx="4572000" cy="0"/>
+            </a:xfrm>
+            <a:prstGeom prst="line">
+              <a:avLst/>
+            </a:prstGeom>
+            <a:ln w="12700">
+              <a:solidFill>
+                <a:schemeClr val="tx1"/>
+              </a:solidFill>
+            </a:ln>
+          </p:spPr>
+          <p:style>
+            <a:lnRef idx="1">
+              <a:schemeClr val="accent1"/>
+            </a:lnRef>
+            <a:fillRef idx="0">
+              <a:schemeClr val="accent1"/>
+            </a:fillRef>
+            <a:effectRef idx="0">
+              <a:schemeClr val="accent1"/>
+            </a:effectRef>
+            <a:fontRef idx="minor">
+              <a:schemeClr val="tx1"/>
+            </a:fontRef>
+          </p:style>
+        </p:cxnSp>
+        <p:pic>
+          <p:nvPicPr>
+            <p:cNvPr id="44" name="Picture 43" descr="A picture containing nature, old, rain, photo&#10;&#10;Description automatically generated">
+              <a:extLst>
+                <a:ext uri="{FF2B5EF4-FFF2-40B4-BE49-F238E27FC236}">
+                  <a16:creationId xmlns:a16="http://schemas.microsoft.com/office/drawing/2014/main" id="{6938CE89-768D-164E-B27E-CF4A9D1AAD61}"/>
+                </a:ext>
+              </a:extLst>
+            </p:cNvPr>
+            <p:cNvPicPr>
+              <a:picLocks noChangeAspect="1"/>
+            </p:cNvPicPr>
+            <p:nvPr/>
+          </p:nvPicPr>
+          <p:blipFill>
+            <a:blip r:embed="rId4">
+              <a:extLst>
+                <a:ext uri="{28A0092B-C50C-407E-A947-70E740481C1C}">
+                  <a14:useLocalDpi xmlns:a14="http://schemas.microsoft.com/office/drawing/2010/main" val="0"/>
+                </a:ext>
+              </a:extLst>
+            </a:blip>
+            <a:stretch>
+              <a:fillRect/>
+            </a:stretch>
+          </p:blipFill>
+          <p:spPr>
+            <a:xfrm>
+              <a:off x="203617" y="821080"/>
+              <a:ext cx="2447779" cy="1828800"/>
+            </a:xfrm>
+            <a:prstGeom prst="rect">
+              <a:avLst/>
+            </a:prstGeom>
+          </p:spPr>
+        </p:pic>
+        <p:pic>
+          <p:nvPicPr>
+            <p:cNvPr id="45" name="Picture 44" descr="A picture containing object, green, clock, light&#10;&#10;Description automatically generated">
+              <a:extLst>
+                <a:ext uri="{FF2B5EF4-FFF2-40B4-BE49-F238E27FC236}">
+                  <a16:creationId xmlns:a16="http://schemas.microsoft.com/office/drawing/2014/main" id="{2EE856AC-B332-7A48-B168-4BB3B775BACA}"/>
+                </a:ext>
+              </a:extLst>
+            </p:cNvPr>
+            <p:cNvPicPr>
+              <a:picLocks noChangeAspect="1"/>
+            </p:cNvPicPr>
+            <p:nvPr/>
+          </p:nvPicPr>
+          <p:blipFill>
+            <a:blip r:embed="rId5">
+              <a:extLst>
+                <a:ext uri="{28A0092B-C50C-407E-A947-70E740481C1C}">
+                  <a14:useLocalDpi xmlns:a14="http://schemas.microsoft.com/office/drawing/2010/main" val="0"/>
+                </a:ext>
+              </a:extLst>
+            </a:blip>
+            <a:stretch>
+              <a:fillRect/>
+            </a:stretch>
+          </p:blipFill>
+          <p:spPr>
+            <a:xfrm>
+              <a:off x="2730120" y="821080"/>
+              <a:ext cx="2447779" cy="1828800"/>
+            </a:xfrm>
+            <a:prstGeom prst="rect">
+              <a:avLst/>
+            </a:prstGeom>
+          </p:spPr>
+        </p:pic>
+        <p:pic>
+          <p:nvPicPr>
+            <p:cNvPr id="46" name="Picture 45" descr="A picture containing nature, rain, black, white&#10;&#10;Description automatically generated">
+              <a:extLst>
+                <a:ext uri="{FF2B5EF4-FFF2-40B4-BE49-F238E27FC236}">
+                  <a16:creationId xmlns:a16="http://schemas.microsoft.com/office/drawing/2014/main" id="{A77CBC6A-223C-2640-8B45-9E709160E0EA}"/>
+                </a:ext>
+              </a:extLst>
+            </p:cNvPr>
+            <p:cNvPicPr>
+              <a:picLocks noChangeAspect="1"/>
+            </p:cNvPicPr>
+            <p:nvPr/>
+          </p:nvPicPr>
+          <p:blipFill>
+            <a:blip r:embed="rId6">
+              <a:extLst>
+                <a:ext uri="{28A0092B-C50C-407E-A947-70E740481C1C}">
+                  <a14:useLocalDpi xmlns:a14="http://schemas.microsoft.com/office/drawing/2010/main" val="0"/>
+                </a:ext>
+              </a:extLst>
+            </a:blip>
+            <a:stretch>
+              <a:fillRect/>
+            </a:stretch>
+          </p:blipFill>
+          <p:spPr>
+            <a:xfrm>
+              <a:off x="5778449" y="821080"/>
+              <a:ext cx="2447779" cy="1828800"/>
+            </a:xfrm>
+            <a:prstGeom prst="rect">
+              <a:avLst/>
+            </a:prstGeom>
+          </p:spPr>
+        </p:pic>
+        <p:pic>
+          <p:nvPicPr>
+            <p:cNvPr id="47" name="Picture 46" descr="A picture containing playing, holding, sitting, laptop&#10;&#10;Description automatically generated">
+              <a:extLst>
+                <a:ext uri="{FF2B5EF4-FFF2-40B4-BE49-F238E27FC236}">
+                  <a16:creationId xmlns:a16="http://schemas.microsoft.com/office/drawing/2014/main" id="{9E902101-AC31-4248-B66C-4A1A8ECC4235}"/>
+                </a:ext>
+              </a:extLst>
+            </p:cNvPr>
+            <p:cNvPicPr>
+              <a:picLocks noChangeAspect="1"/>
+            </p:cNvPicPr>
+            <p:nvPr/>
+          </p:nvPicPr>
+          <p:blipFill>
+            <a:blip r:embed="rId7">
+              <a:extLst>
+                <a:ext uri="{28A0092B-C50C-407E-A947-70E740481C1C}">
+                  <a14:useLocalDpi xmlns:a14="http://schemas.microsoft.com/office/drawing/2010/main" val="0"/>
+                </a:ext>
+              </a:extLst>
+            </a:blip>
+            <a:stretch>
+              <a:fillRect/>
+            </a:stretch>
+          </p:blipFill>
+          <p:spPr>
+            <a:xfrm>
+              <a:off x="8312351" y="821080"/>
+              <a:ext cx="2447779" cy="1828800"/>
+            </a:xfrm>
+            <a:prstGeom prst="rect">
+              <a:avLst/>
+            </a:prstGeom>
+          </p:spPr>
+        </p:pic>
+      </p:grpSp>
+      <p:sp>
+        <p:nvSpPr>
+          <p:cNvPr id="48" name="TextBox 47">
+            <a:extLst>
+              <a:ext uri="{FF2B5EF4-FFF2-40B4-BE49-F238E27FC236}">
+                <a16:creationId xmlns:a16="http://schemas.microsoft.com/office/drawing/2014/main" id="{95849FDE-6CDA-CB43-89E9-77E91592C44B}"/>
+              </a:ext>
+            </a:extLst>
+          </p:cNvPr>
+          <p:cNvSpPr txBox="1"/>
+          <p:nvPr/>
+        </p:nvSpPr>
+        <p:spPr>
+          <a:xfrm>
+            <a:off x="81148" y="4739332"/>
+            <a:ext cx="481222" cy="584775"/>
+          </a:xfrm>
+          <a:prstGeom prst="rect">
+            <a:avLst/>
+          </a:prstGeom>
+          <a:noFill/>
+        </p:spPr>
+        <p:txBody>
+          <a:bodyPr wrap="none" rtlCol="0">
+            <a:spAutoFit/>
+          </a:bodyPr>
+          <a:lstStyle/>
+          <a:p>
+            <a:r>
+              <a:rPr lang="en-US" sz="3200" b="1" dirty="0">
+                <a:latin typeface="Arial" panose="020B0604020202020204" pitchFamily="34" charset="0"/>
+                <a:cs typeface="Arial" panose="020B0604020202020204" pitchFamily="34" charset="0"/>
+              </a:rPr>
+              <a:t>C</a:t>
+            </a:r>
+          </a:p>
+        </p:txBody>
+      </p:sp>
     </p:spTree>
     <p:extLst>
       <p:ext uri="{BB962C8B-B14F-4D97-AF65-F5344CB8AC3E}">

</xml_diff>